<commit_message>
POwerPoint Vorschlag für Bsp-Code + Kommentare
</commit_message>
<xml_diff>
--- a/DHT22_Retzlaff_Baumgart.pptx
+++ b/DHT22_Retzlaff_Baumgart.pptx
@@ -5,10 +5,10 @@
     <p:sldMasterId id="2147483673" r:id="rId1"/>
   </p:sldMasterIdLst>
   <p:notesMasterIdLst>
-    <p:notesMasterId r:id="rId11"/>
+    <p:notesMasterId r:id="rId18"/>
   </p:notesMasterIdLst>
   <p:handoutMasterIdLst>
-    <p:handoutMasterId r:id="rId12"/>
+    <p:handoutMasterId r:id="rId19"/>
   </p:handoutMasterIdLst>
   <p:sldIdLst>
     <p:sldId id="257" r:id="rId2"/>
@@ -18,8 +18,15 @@
     <p:sldId id="263" r:id="rId6"/>
     <p:sldId id="265" r:id="rId7"/>
     <p:sldId id="269" r:id="rId8"/>
-    <p:sldId id="268" r:id="rId9"/>
-    <p:sldId id="264" r:id="rId10"/>
+    <p:sldId id="270" r:id="rId9"/>
+    <p:sldId id="271" r:id="rId10"/>
+    <p:sldId id="272" r:id="rId11"/>
+    <p:sldId id="273" r:id="rId12"/>
+    <p:sldId id="274" r:id="rId13"/>
+    <p:sldId id="275" r:id="rId14"/>
+    <p:sldId id="276" r:id="rId15"/>
+    <p:sldId id="268" r:id="rId16"/>
+    <p:sldId id="264" r:id="rId17"/>
   </p:sldIdLst>
   <p:sldSz cx="12192000" cy="6858000"/>
   <p:notesSz cx="6858000" cy="9144000"/>
@@ -5331,6 +5338,1726 @@
 </p:sld>
 </file>
 
+<file path=ppt/slides/slide10.xml><?xml version="1.0" encoding="utf-8"?>
+<p:sld xmlns:a="http://schemas.openxmlformats.org/drawingml/2006/main" xmlns:r="http://schemas.openxmlformats.org/officeDocument/2006/relationships" xmlns:p="http://schemas.openxmlformats.org/presentationml/2006/main">
+  <p:cSld>
+    <p:spTree>
+      <p:nvGrpSpPr>
+        <p:cNvPr id="1" name=""/>
+        <p:cNvGrpSpPr/>
+        <p:nvPr/>
+      </p:nvGrpSpPr>
+      <p:grpSpPr>
+        <a:xfrm>
+          <a:off x="0" y="0"/>
+          <a:ext cx="0" cy="0"/>
+          <a:chOff x="0" y="0"/>
+          <a:chExt cx="0" cy="0"/>
+        </a:xfrm>
+      </p:grpSpPr>
+      <p:sp>
+        <p:nvSpPr>
+          <p:cNvPr id="2" name="Titel 1">
+            <a:extLst>
+              <a:ext uri="{FF2B5EF4-FFF2-40B4-BE49-F238E27FC236}">
+                <a16:creationId xmlns:a16="http://schemas.microsoft.com/office/drawing/2014/main" id="{E04E5321-1992-5BE1-1045-46E66EC6CB6F}"/>
+              </a:ext>
+            </a:extLst>
+          </p:cNvPr>
+          <p:cNvSpPr>
+            <a:spLocks noGrp="1"/>
+          </p:cNvSpPr>
+          <p:nvPr>
+            <p:ph type="title"/>
+          </p:nvPr>
+        </p:nvSpPr>
+        <p:spPr/>
+        <p:txBody>
+          <a:bodyPr/>
+          <a:lstStyle/>
+          <a:p>
+            <a:r>
+              <a:rPr lang="de-DE" dirty="0"/>
+              <a:t>„</a:t>
+            </a:r>
+            <a:r>
+              <a:rPr lang="de-DE" dirty="0" err="1"/>
+              <a:t>dht</a:t>
+            </a:r>
+            <a:r>
+              <a:rPr lang="de-DE" dirty="0"/>
+              <a:t>“</a:t>
+            </a:r>
+          </a:p>
+        </p:txBody>
+      </p:sp>
+      <p:pic>
+        <p:nvPicPr>
+          <p:cNvPr id="11" name="Inhaltsplatzhalter 10">
+            <a:extLst>
+              <a:ext uri="{FF2B5EF4-FFF2-40B4-BE49-F238E27FC236}">
+                <a16:creationId xmlns:a16="http://schemas.microsoft.com/office/drawing/2014/main" id="{EF8B4C40-4599-8232-4DE0-8C10224D324F}"/>
+              </a:ext>
+            </a:extLst>
+          </p:cNvPr>
+          <p:cNvPicPr>
+            <a:picLocks noGrp="1" noChangeAspect="1"/>
+          </p:cNvPicPr>
+          <p:nvPr>
+            <p:ph sz="half" idx="1"/>
+          </p:nvPr>
+        </p:nvPicPr>
+        <p:blipFill rotWithShape="1">
+          <a:blip r:embed="rId2"/>
+          <a:srcRect l="6249" t="9299" r="7145" b="9610"/>
+          <a:stretch/>
+        </p:blipFill>
+        <p:spPr>
+          <a:xfrm>
+            <a:off x="393090" y="2014194"/>
+            <a:ext cx="5078897" cy="3304119"/>
+          </a:xfrm>
+        </p:spPr>
+      </p:pic>
+      <p:pic>
+        <p:nvPicPr>
+          <p:cNvPr id="19" name="Inhaltsplatzhalter 18">
+            <a:extLst>
+              <a:ext uri="{FF2B5EF4-FFF2-40B4-BE49-F238E27FC236}">
+                <a16:creationId xmlns:a16="http://schemas.microsoft.com/office/drawing/2014/main" id="{7F8EE62D-0F21-7E68-5718-314CF93C8440}"/>
+              </a:ext>
+            </a:extLst>
+          </p:cNvPr>
+          <p:cNvPicPr>
+            <a:picLocks noGrp="1" noChangeAspect="1"/>
+          </p:cNvPicPr>
+          <p:nvPr>
+            <p:ph sz="half" idx="2"/>
+          </p:nvPr>
+        </p:nvPicPr>
+        <p:blipFill rotWithShape="1">
+          <a:blip r:embed="rId3"/>
+          <a:srcRect l="5750" t="12984" r="5932" b="13153"/>
+          <a:stretch/>
+        </p:blipFill>
+        <p:spPr>
+          <a:xfrm>
+            <a:off x="5471987" y="2014193"/>
+            <a:ext cx="6340826" cy="2673217"/>
+          </a:xfrm>
+        </p:spPr>
+      </p:pic>
+      <p:sp>
+        <p:nvSpPr>
+          <p:cNvPr id="4" name="Datumsplatzhalter 3">
+            <a:extLst>
+              <a:ext uri="{FF2B5EF4-FFF2-40B4-BE49-F238E27FC236}">
+                <a16:creationId xmlns:a16="http://schemas.microsoft.com/office/drawing/2014/main" id="{B423C320-8620-3E84-A909-0D3F1295A6A3}"/>
+              </a:ext>
+            </a:extLst>
+          </p:cNvPr>
+          <p:cNvSpPr>
+            <a:spLocks noGrp="1"/>
+          </p:cNvSpPr>
+          <p:nvPr>
+            <p:ph type="dt" sz="half" idx="10"/>
+          </p:nvPr>
+        </p:nvSpPr>
+        <p:spPr/>
+        <p:txBody>
+          <a:bodyPr/>
+          <a:lstStyle/>
+          <a:p>
+            <a:pPr rtl="0"/>
+            <a:fld id="{878708FE-2DD0-4A9D-BF1C-99DA12B2423D}" type="datetime1">
+              <a:rPr lang="de-DE" smtClean="0"/>
+              <a:t>21.01.2023</a:t>
+            </a:fld>
+            <a:endParaRPr lang="en-US"/>
+          </a:p>
+        </p:txBody>
+      </p:sp>
+      <p:sp>
+        <p:nvSpPr>
+          <p:cNvPr id="5" name="Fußzeilenplatzhalter 4">
+            <a:extLst>
+              <a:ext uri="{FF2B5EF4-FFF2-40B4-BE49-F238E27FC236}">
+                <a16:creationId xmlns:a16="http://schemas.microsoft.com/office/drawing/2014/main" id="{5F79AC8D-9D25-8B45-C8A4-4F83DC3561B7}"/>
+              </a:ext>
+            </a:extLst>
+          </p:cNvPr>
+          <p:cNvSpPr>
+            <a:spLocks noGrp="1"/>
+          </p:cNvSpPr>
+          <p:nvPr>
+            <p:ph type="ftr" sz="quarter" idx="11"/>
+          </p:nvPr>
+        </p:nvSpPr>
+        <p:spPr/>
+        <p:txBody>
+          <a:bodyPr/>
+          <a:lstStyle/>
+          <a:p>
+            <a:pPr rtl="0"/>
+            <a:r>
+              <a:rPr lang="de-DE" dirty="0"/>
+              <a:t>Abbildung 5: Aus </a:t>
+            </a:r>
+            <a:r>
+              <a:rPr lang="de-DE" dirty="0">
+                <a:solidFill>
+                  <a:schemeClr val="tx1"/>
+                </a:solidFill>
+              </a:rPr>
+              <a:t>„</a:t>
+            </a:r>
+            <a:r>
+              <a:rPr lang="de-DE" dirty="0" err="1">
+                <a:solidFill>
+                  <a:schemeClr val="tx1"/>
+                </a:solidFill>
+              </a:rPr>
+              <a:t>dht.c</a:t>
+            </a:r>
+            <a:r>
+              <a:rPr lang="de-DE" dirty="0">
+                <a:solidFill>
+                  <a:schemeClr val="tx1"/>
+                </a:solidFill>
+              </a:rPr>
+              <a:t>“ </a:t>
+            </a:r>
+            <a:r>
+              <a:rPr lang="de-DE" dirty="0">
+                <a:solidFill>
+                  <a:schemeClr val="tx1"/>
+                </a:solidFill>
+                <a:sym typeface="Wingdings" panose="05000000000000000000" pitchFamily="2" charset="2"/>
+              </a:rPr>
+              <a:t>Screen </a:t>
+            </a:r>
+            <a:r>
+              <a:rPr lang="de-DE" dirty="0" err="1">
+                <a:solidFill>
+                  <a:schemeClr val="tx1"/>
+                </a:solidFill>
+                <a:sym typeface="Wingdings" panose="05000000000000000000" pitchFamily="2" charset="2"/>
+              </a:rPr>
+              <a:t>shot</a:t>
+            </a:r>
+            <a:r>
+              <a:rPr lang="de-DE" dirty="0">
+                <a:solidFill>
+                  <a:schemeClr val="tx1"/>
+                </a:solidFill>
+                <a:sym typeface="Wingdings" panose="05000000000000000000" pitchFamily="2" charset="2"/>
+              </a:rPr>
+              <a:t> 3 </a:t>
+            </a:r>
+            <a:endParaRPr lang="de-DE" dirty="0">
+              <a:solidFill>
+                <a:schemeClr val="tx1"/>
+              </a:solidFill>
+            </a:endParaRPr>
+          </a:p>
+          <a:p>
+            <a:pPr rtl="0"/>
+            <a:r>
+              <a:rPr lang="de-DE" dirty="0"/>
+              <a:t>Abbildung 6: Aus </a:t>
+            </a:r>
+            <a:r>
+              <a:rPr lang="de-DE" dirty="0">
+                <a:solidFill>
+                  <a:schemeClr val="tx1"/>
+                </a:solidFill>
+              </a:rPr>
+              <a:t>„</a:t>
+            </a:r>
+            <a:r>
+              <a:rPr lang="de-DE" dirty="0" err="1">
+                <a:solidFill>
+                  <a:schemeClr val="tx1"/>
+                </a:solidFill>
+              </a:rPr>
+              <a:t>dht.c</a:t>
+            </a:r>
+            <a:r>
+              <a:rPr lang="de-DE" dirty="0">
+                <a:solidFill>
+                  <a:schemeClr val="tx1"/>
+                </a:solidFill>
+              </a:rPr>
+              <a:t>“ </a:t>
+            </a:r>
+            <a:r>
+              <a:rPr lang="de-DE" dirty="0">
+                <a:solidFill>
+                  <a:schemeClr val="tx1"/>
+                </a:solidFill>
+                <a:sym typeface="Wingdings" panose="05000000000000000000" pitchFamily="2" charset="2"/>
+              </a:rPr>
+              <a:t> Screen </a:t>
+            </a:r>
+            <a:r>
+              <a:rPr lang="de-DE" dirty="0" err="1">
+                <a:solidFill>
+                  <a:schemeClr val="tx1"/>
+                </a:solidFill>
+                <a:sym typeface="Wingdings" panose="05000000000000000000" pitchFamily="2" charset="2"/>
+              </a:rPr>
+              <a:t>shot</a:t>
+            </a:r>
+            <a:r>
+              <a:rPr lang="de-DE" dirty="0">
+                <a:solidFill>
+                  <a:schemeClr val="tx1"/>
+                </a:solidFill>
+                <a:sym typeface="Wingdings" panose="05000000000000000000" pitchFamily="2" charset="2"/>
+              </a:rPr>
+              <a:t> 3</a:t>
+            </a:r>
+            <a:endParaRPr lang="en-US" dirty="0"/>
+          </a:p>
+        </p:txBody>
+      </p:sp>
+    </p:spTree>
+    <p:extLst>
+      <p:ext uri="{BB962C8B-B14F-4D97-AF65-F5344CB8AC3E}">
+        <p14:creationId xmlns:p14="http://schemas.microsoft.com/office/powerpoint/2010/main" val="1560953022"/>
+      </p:ext>
+    </p:extLst>
+  </p:cSld>
+  <p:clrMapOvr>
+    <a:masterClrMapping/>
+  </p:clrMapOvr>
+</p:sld>
+</file>
+
+<file path=ppt/slides/slide11.xml><?xml version="1.0" encoding="utf-8"?>
+<p:sld xmlns:a="http://schemas.openxmlformats.org/drawingml/2006/main" xmlns:r="http://schemas.openxmlformats.org/officeDocument/2006/relationships" xmlns:p="http://schemas.openxmlformats.org/presentationml/2006/main">
+  <p:cSld>
+    <p:spTree>
+      <p:nvGrpSpPr>
+        <p:cNvPr id="1" name=""/>
+        <p:cNvGrpSpPr/>
+        <p:nvPr/>
+      </p:nvGrpSpPr>
+      <p:grpSpPr>
+        <a:xfrm>
+          <a:off x="0" y="0"/>
+          <a:ext cx="0" cy="0"/>
+          <a:chOff x="0" y="0"/>
+          <a:chExt cx="0" cy="0"/>
+        </a:xfrm>
+      </p:grpSpPr>
+      <p:sp>
+        <p:nvSpPr>
+          <p:cNvPr id="2" name="Titel 1">
+            <a:extLst>
+              <a:ext uri="{FF2B5EF4-FFF2-40B4-BE49-F238E27FC236}">
+                <a16:creationId xmlns:a16="http://schemas.microsoft.com/office/drawing/2014/main" id="{EFBEA23B-DFFB-92A4-347D-620F377C90FA}"/>
+              </a:ext>
+            </a:extLst>
+          </p:cNvPr>
+          <p:cNvSpPr>
+            <a:spLocks noGrp="1"/>
+          </p:cNvSpPr>
+          <p:nvPr>
+            <p:ph type="title"/>
+          </p:nvPr>
+        </p:nvSpPr>
+        <p:spPr/>
+        <p:txBody>
+          <a:bodyPr/>
+          <a:lstStyle/>
+          <a:p>
+            <a:r>
+              <a:rPr lang="de-DE" dirty="0"/>
+              <a:t>„</a:t>
+            </a:r>
+            <a:r>
+              <a:rPr lang="de-DE" dirty="0" err="1"/>
+              <a:t>oled</a:t>
+            </a:r>
+            <a:r>
+              <a:rPr lang="de-DE" dirty="0"/>
+              <a:t>“</a:t>
+            </a:r>
+          </a:p>
+        </p:txBody>
+      </p:sp>
+      <p:pic>
+        <p:nvPicPr>
+          <p:cNvPr id="7" name="Inhaltsplatzhalter 6">
+            <a:extLst>
+              <a:ext uri="{FF2B5EF4-FFF2-40B4-BE49-F238E27FC236}">
+                <a16:creationId xmlns:a16="http://schemas.microsoft.com/office/drawing/2014/main" id="{0E652450-48BA-9DA2-E9B9-1E3364BAFE42}"/>
+              </a:ext>
+            </a:extLst>
+          </p:cNvPr>
+          <p:cNvPicPr>
+            <a:picLocks noGrp="1" noChangeAspect="1"/>
+          </p:cNvPicPr>
+          <p:nvPr>
+            <p:ph idx="1"/>
+          </p:nvPr>
+        </p:nvPicPr>
+        <p:blipFill rotWithShape="1">
+          <a:blip r:embed="rId2"/>
+          <a:srcRect l="4486" t="13498" r="4869" b="12900"/>
+          <a:stretch/>
+        </p:blipFill>
+        <p:spPr>
+          <a:xfrm>
+            <a:off x="1518081" y="2681056"/>
+            <a:ext cx="9117367" cy="2716567"/>
+          </a:xfrm>
+        </p:spPr>
+      </p:pic>
+      <p:sp>
+        <p:nvSpPr>
+          <p:cNvPr id="4" name="Datumsplatzhalter 3">
+            <a:extLst>
+              <a:ext uri="{FF2B5EF4-FFF2-40B4-BE49-F238E27FC236}">
+                <a16:creationId xmlns:a16="http://schemas.microsoft.com/office/drawing/2014/main" id="{C2BEB9C8-F205-39B8-7EE7-D887E591AAF7}"/>
+              </a:ext>
+            </a:extLst>
+          </p:cNvPr>
+          <p:cNvSpPr>
+            <a:spLocks noGrp="1"/>
+          </p:cNvSpPr>
+          <p:nvPr>
+            <p:ph type="dt" sz="half" idx="10"/>
+          </p:nvPr>
+        </p:nvSpPr>
+        <p:spPr/>
+        <p:txBody>
+          <a:bodyPr/>
+          <a:lstStyle/>
+          <a:p>
+            <a:pPr rtl="0"/>
+            <a:fld id="{878708FE-2DD0-4A9D-BF1C-99DA12B2423D}" type="datetime1">
+              <a:rPr lang="de-DE" smtClean="0"/>
+              <a:t>21.01.2023</a:t>
+            </a:fld>
+            <a:endParaRPr lang="en-US"/>
+          </a:p>
+        </p:txBody>
+      </p:sp>
+      <p:sp>
+        <p:nvSpPr>
+          <p:cNvPr id="5" name="Fußzeilenplatzhalter 4">
+            <a:extLst>
+              <a:ext uri="{FF2B5EF4-FFF2-40B4-BE49-F238E27FC236}">
+                <a16:creationId xmlns:a16="http://schemas.microsoft.com/office/drawing/2014/main" id="{5331FB2D-4802-179E-4825-E5C4AF2FF269}"/>
+              </a:ext>
+            </a:extLst>
+          </p:cNvPr>
+          <p:cNvSpPr>
+            <a:spLocks noGrp="1"/>
+          </p:cNvSpPr>
+          <p:nvPr>
+            <p:ph type="ftr" sz="quarter" idx="11"/>
+          </p:nvPr>
+        </p:nvSpPr>
+        <p:spPr/>
+        <p:txBody>
+          <a:bodyPr/>
+          <a:lstStyle/>
+          <a:p>
+            <a:pPr rtl="0"/>
+            <a:r>
+              <a:rPr lang="de-DE" dirty="0"/>
+              <a:t>Abbildung x: Aus </a:t>
+            </a:r>
+            <a:r>
+              <a:rPr lang="de-DE" dirty="0">
+                <a:solidFill>
+                  <a:schemeClr val="tx1"/>
+                </a:solidFill>
+              </a:rPr>
+              <a:t>„</a:t>
+            </a:r>
+            <a:r>
+              <a:rPr lang="de-DE" dirty="0" err="1">
+                <a:solidFill>
+                  <a:schemeClr val="tx1"/>
+                </a:solidFill>
+              </a:rPr>
+              <a:t>oled.c</a:t>
+            </a:r>
+            <a:r>
+              <a:rPr lang="de-DE" dirty="0">
+                <a:solidFill>
+                  <a:schemeClr val="tx1"/>
+                </a:solidFill>
+              </a:rPr>
+              <a:t>“ </a:t>
+            </a:r>
+            <a:r>
+              <a:rPr lang="de-DE" dirty="0">
+                <a:solidFill>
+                  <a:schemeClr val="tx1"/>
+                </a:solidFill>
+                <a:sym typeface="Wingdings" panose="05000000000000000000" pitchFamily="2" charset="2"/>
+              </a:rPr>
+              <a:t> Screen </a:t>
+            </a:r>
+            <a:r>
+              <a:rPr lang="de-DE" dirty="0" err="1">
+                <a:solidFill>
+                  <a:schemeClr val="tx1"/>
+                </a:solidFill>
+                <a:sym typeface="Wingdings" panose="05000000000000000000" pitchFamily="2" charset="2"/>
+              </a:rPr>
+              <a:t>shot</a:t>
+            </a:r>
+            <a:r>
+              <a:rPr lang="de-DE" dirty="0">
+                <a:solidFill>
+                  <a:schemeClr val="tx1"/>
+                </a:solidFill>
+                <a:sym typeface="Wingdings" panose="05000000000000000000" pitchFamily="2" charset="2"/>
+              </a:rPr>
+              <a:t> 4</a:t>
+            </a:r>
+            <a:endParaRPr lang="en-US" dirty="0"/>
+          </a:p>
+        </p:txBody>
+      </p:sp>
+    </p:spTree>
+    <p:extLst>
+      <p:ext uri="{BB962C8B-B14F-4D97-AF65-F5344CB8AC3E}">
+        <p14:creationId xmlns:p14="http://schemas.microsoft.com/office/powerpoint/2010/main" val="1429165912"/>
+      </p:ext>
+    </p:extLst>
+  </p:cSld>
+  <p:clrMapOvr>
+    <a:masterClrMapping/>
+  </p:clrMapOvr>
+</p:sld>
+</file>
+
+<file path=ppt/slides/slide12.xml><?xml version="1.0" encoding="utf-8"?>
+<p:sld xmlns:a="http://schemas.openxmlformats.org/drawingml/2006/main" xmlns:r="http://schemas.openxmlformats.org/officeDocument/2006/relationships" xmlns:p="http://schemas.openxmlformats.org/presentationml/2006/main">
+  <p:cSld>
+    <p:spTree>
+      <p:nvGrpSpPr>
+        <p:cNvPr id="1" name=""/>
+        <p:cNvGrpSpPr/>
+        <p:nvPr/>
+      </p:nvGrpSpPr>
+      <p:grpSpPr>
+        <a:xfrm>
+          <a:off x="0" y="0"/>
+          <a:ext cx="0" cy="0"/>
+          <a:chOff x="0" y="0"/>
+          <a:chExt cx="0" cy="0"/>
+        </a:xfrm>
+      </p:grpSpPr>
+      <p:sp>
+        <p:nvSpPr>
+          <p:cNvPr id="2" name="Titel 1">
+            <a:extLst>
+              <a:ext uri="{FF2B5EF4-FFF2-40B4-BE49-F238E27FC236}">
+                <a16:creationId xmlns:a16="http://schemas.microsoft.com/office/drawing/2014/main" id="{9758E474-76B8-CFC8-6BD1-5AF0D4B72C1A}"/>
+              </a:ext>
+            </a:extLst>
+          </p:cNvPr>
+          <p:cNvSpPr>
+            <a:spLocks noGrp="1"/>
+          </p:cNvSpPr>
+          <p:nvPr>
+            <p:ph type="title"/>
+          </p:nvPr>
+        </p:nvSpPr>
+        <p:spPr/>
+        <p:txBody>
+          <a:bodyPr/>
+          <a:lstStyle/>
+          <a:p>
+            <a:r>
+              <a:rPr lang="de-DE" dirty="0"/>
+              <a:t>„</a:t>
+            </a:r>
+            <a:r>
+              <a:rPr lang="de-DE" dirty="0" err="1"/>
+              <a:t>timer</a:t>
+            </a:r>
+            <a:r>
+              <a:rPr lang="de-DE" dirty="0"/>
+              <a:t>“</a:t>
+            </a:r>
+          </a:p>
+        </p:txBody>
+      </p:sp>
+      <p:sp>
+        <p:nvSpPr>
+          <p:cNvPr id="8" name="Textplatzhalter 7">
+            <a:extLst>
+              <a:ext uri="{FF2B5EF4-FFF2-40B4-BE49-F238E27FC236}">
+                <a16:creationId xmlns:a16="http://schemas.microsoft.com/office/drawing/2014/main" id="{055D7D8F-D625-AF57-0F48-16BE45A6B1D1}"/>
+              </a:ext>
+            </a:extLst>
+          </p:cNvPr>
+          <p:cNvSpPr>
+            <a:spLocks noGrp="1"/>
+          </p:cNvSpPr>
+          <p:nvPr>
+            <p:ph type="body" idx="1"/>
+          </p:nvPr>
+        </p:nvSpPr>
+        <p:spPr>
+          <a:xfrm>
+            <a:off x="1069848" y="1612695"/>
+            <a:ext cx="4663440" cy="640080"/>
+          </a:xfrm>
+        </p:spPr>
+        <p:txBody>
+          <a:bodyPr/>
+          <a:lstStyle/>
+          <a:p>
+            <a:r>
+              <a:rPr lang="de-DE" dirty="0"/>
+              <a:t>Start-</a:t>
+            </a:r>
+            <a:r>
+              <a:rPr lang="de-DE" dirty="0" err="1"/>
+              <a:t>Timer</a:t>
+            </a:r>
+            <a:endParaRPr lang="de-DE" dirty="0"/>
+          </a:p>
+        </p:txBody>
+      </p:sp>
+      <p:sp>
+        <p:nvSpPr>
+          <p:cNvPr id="10" name="Textplatzhalter 9">
+            <a:extLst>
+              <a:ext uri="{FF2B5EF4-FFF2-40B4-BE49-F238E27FC236}">
+                <a16:creationId xmlns:a16="http://schemas.microsoft.com/office/drawing/2014/main" id="{8CE2C61A-2DE3-1CF5-20EC-9EB19DEF1A40}"/>
+              </a:ext>
+            </a:extLst>
+          </p:cNvPr>
+          <p:cNvSpPr>
+            <a:spLocks noGrp="1"/>
+          </p:cNvSpPr>
+          <p:nvPr>
+            <p:ph type="body" sz="quarter" idx="3"/>
+          </p:nvPr>
+        </p:nvSpPr>
+        <p:spPr>
+          <a:xfrm>
+            <a:off x="6371596" y="1612695"/>
+            <a:ext cx="4663440" cy="640080"/>
+          </a:xfrm>
+        </p:spPr>
+        <p:txBody>
+          <a:bodyPr/>
+          <a:lstStyle/>
+          <a:p>
+            <a:r>
+              <a:rPr lang="de-DE" dirty="0"/>
+              <a:t>System-</a:t>
+            </a:r>
+            <a:r>
+              <a:rPr lang="de-DE" dirty="0" err="1"/>
+              <a:t>Timer</a:t>
+            </a:r>
+            <a:endParaRPr lang="de-DE" dirty="0"/>
+          </a:p>
+        </p:txBody>
+      </p:sp>
+      <p:pic>
+        <p:nvPicPr>
+          <p:cNvPr id="21" name="Inhaltsplatzhalter 20">
+            <a:extLst>
+              <a:ext uri="{FF2B5EF4-FFF2-40B4-BE49-F238E27FC236}">
+                <a16:creationId xmlns:a16="http://schemas.microsoft.com/office/drawing/2014/main" id="{FD9BA809-1A10-FD38-B4D8-E7152EC33AEE}"/>
+              </a:ext>
+            </a:extLst>
+          </p:cNvPr>
+          <p:cNvPicPr>
+            <a:picLocks noGrp="1" noChangeAspect="1"/>
+          </p:cNvPicPr>
+          <p:nvPr>
+            <p:ph sz="quarter" idx="4"/>
+          </p:nvPr>
+        </p:nvPicPr>
+        <p:blipFill rotWithShape="1">
+          <a:blip r:embed="rId2"/>
+          <a:srcRect l="4795" t="6862" r="5837" b="7276"/>
+          <a:stretch/>
+        </p:blipFill>
+        <p:spPr>
+          <a:xfrm>
+            <a:off x="6371596" y="2086808"/>
+            <a:ext cx="5231519" cy="4397926"/>
+          </a:xfrm>
+        </p:spPr>
+      </p:pic>
+      <p:sp>
+        <p:nvSpPr>
+          <p:cNvPr id="4" name="Datumsplatzhalter 3">
+            <a:extLst>
+              <a:ext uri="{FF2B5EF4-FFF2-40B4-BE49-F238E27FC236}">
+                <a16:creationId xmlns:a16="http://schemas.microsoft.com/office/drawing/2014/main" id="{6920C4FC-7B15-FFF5-C8F9-95B473815321}"/>
+              </a:ext>
+            </a:extLst>
+          </p:cNvPr>
+          <p:cNvSpPr>
+            <a:spLocks noGrp="1"/>
+          </p:cNvSpPr>
+          <p:nvPr>
+            <p:ph type="dt" sz="half" idx="10"/>
+          </p:nvPr>
+        </p:nvSpPr>
+        <p:spPr/>
+        <p:txBody>
+          <a:bodyPr/>
+          <a:lstStyle/>
+          <a:p>
+            <a:pPr rtl="0"/>
+            <a:fld id="{878708FE-2DD0-4A9D-BF1C-99DA12B2423D}" type="datetime1">
+              <a:rPr lang="de-DE" smtClean="0"/>
+              <a:t>21.01.2023</a:t>
+            </a:fld>
+            <a:endParaRPr lang="en-US"/>
+          </a:p>
+        </p:txBody>
+      </p:sp>
+      <p:sp>
+        <p:nvSpPr>
+          <p:cNvPr id="5" name="Fußzeilenplatzhalter 4">
+            <a:extLst>
+              <a:ext uri="{FF2B5EF4-FFF2-40B4-BE49-F238E27FC236}">
+                <a16:creationId xmlns:a16="http://schemas.microsoft.com/office/drawing/2014/main" id="{891D2DCA-3D4A-D194-5267-1677789B7B95}"/>
+              </a:ext>
+            </a:extLst>
+          </p:cNvPr>
+          <p:cNvSpPr>
+            <a:spLocks noGrp="1"/>
+          </p:cNvSpPr>
+          <p:nvPr>
+            <p:ph type="ftr" sz="quarter" idx="11"/>
+          </p:nvPr>
+        </p:nvSpPr>
+        <p:spPr/>
+        <p:txBody>
+          <a:bodyPr/>
+          <a:lstStyle/>
+          <a:p>
+            <a:pPr rtl="0"/>
+            <a:r>
+              <a:rPr lang="de-DE" dirty="0"/>
+              <a:t>Abbildung x: Aus </a:t>
+            </a:r>
+            <a:r>
+              <a:rPr lang="de-DE" dirty="0">
+                <a:solidFill>
+                  <a:schemeClr val="tx1"/>
+                </a:solidFill>
+              </a:rPr>
+              <a:t>„</a:t>
+            </a:r>
+            <a:r>
+              <a:rPr lang="de-DE" dirty="0" err="1">
+                <a:solidFill>
+                  <a:schemeClr val="tx1"/>
+                </a:solidFill>
+              </a:rPr>
+              <a:t>timer.c</a:t>
+            </a:r>
+            <a:r>
+              <a:rPr lang="de-DE" dirty="0">
+                <a:solidFill>
+                  <a:schemeClr val="tx1"/>
+                </a:solidFill>
+              </a:rPr>
+              <a:t>“ </a:t>
+            </a:r>
+            <a:r>
+              <a:rPr lang="de-DE" dirty="0">
+                <a:solidFill>
+                  <a:schemeClr val="tx1"/>
+                </a:solidFill>
+                <a:sym typeface="Wingdings" panose="05000000000000000000" pitchFamily="2" charset="2"/>
+              </a:rPr>
+              <a:t> </a:t>
+            </a:r>
+            <a:r>
+              <a:rPr lang="de-DE" dirty="0" err="1">
+                <a:solidFill>
+                  <a:schemeClr val="tx1"/>
+                </a:solidFill>
+                <a:sym typeface="Wingdings" panose="05000000000000000000" pitchFamily="2" charset="2"/>
+              </a:rPr>
+              <a:t>Screnn</a:t>
+            </a:r>
+            <a:r>
+              <a:rPr lang="de-DE" dirty="0">
+                <a:solidFill>
+                  <a:schemeClr val="tx1"/>
+                </a:solidFill>
+                <a:sym typeface="Wingdings" panose="05000000000000000000" pitchFamily="2" charset="2"/>
+              </a:rPr>
+              <a:t> </a:t>
+            </a:r>
+            <a:r>
+              <a:rPr lang="de-DE" dirty="0" err="1">
+                <a:solidFill>
+                  <a:schemeClr val="tx1"/>
+                </a:solidFill>
+                <a:sym typeface="Wingdings" panose="05000000000000000000" pitchFamily="2" charset="2"/>
+              </a:rPr>
+              <a:t>shot</a:t>
+            </a:r>
+            <a:r>
+              <a:rPr lang="de-DE" dirty="0">
+                <a:solidFill>
+                  <a:schemeClr val="tx1"/>
+                </a:solidFill>
+                <a:sym typeface="Wingdings" panose="05000000000000000000" pitchFamily="2" charset="2"/>
+              </a:rPr>
+              <a:t> 6</a:t>
+            </a:r>
+            <a:endParaRPr lang="de-DE" dirty="0">
+              <a:solidFill>
+                <a:schemeClr val="tx1"/>
+              </a:solidFill>
+            </a:endParaRPr>
+          </a:p>
+          <a:p>
+            <a:pPr rtl="0"/>
+            <a:r>
+              <a:rPr lang="de-DE" dirty="0"/>
+              <a:t>Abbildung x: Aus </a:t>
+            </a:r>
+            <a:r>
+              <a:rPr lang="de-DE" dirty="0">
+                <a:solidFill>
+                  <a:schemeClr val="tx1"/>
+                </a:solidFill>
+              </a:rPr>
+              <a:t>„</a:t>
+            </a:r>
+            <a:r>
+              <a:rPr lang="de-DE" dirty="0" err="1">
+                <a:solidFill>
+                  <a:schemeClr val="tx1"/>
+                </a:solidFill>
+              </a:rPr>
+              <a:t>timerstart.c</a:t>
+            </a:r>
+            <a:r>
+              <a:rPr lang="de-DE" dirty="0">
+                <a:solidFill>
+                  <a:schemeClr val="tx1"/>
+                </a:solidFill>
+              </a:rPr>
+              <a:t>“ </a:t>
+            </a:r>
+            <a:r>
+              <a:rPr lang="de-DE" dirty="0">
+                <a:solidFill>
+                  <a:schemeClr val="tx1"/>
+                </a:solidFill>
+                <a:sym typeface="Wingdings" panose="05000000000000000000" pitchFamily="2" charset="2"/>
+              </a:rPr>
+              <a:t> Screen </a:t>
+            </a:r>
+            <a:r>
+              <a:rPr lang="de-DE" dirty="0" err="1">
+                <a:solidFill>
+                  <a:schemeClr val="tx1"/>
+                </a:solidFill>
+                <a:sym typeface="Wingdings" panose="05000000000000000000" pitchFamily="2" charset="2"/>
+              </a:rPr>
+              <a:t>shot</a:t>
+            </a:r>
+            <a:r>
+              <a:rPr lang="de-DE" dirty="0">
+                <a:solidFill>
+                  <a:schemeClr val="tx1"/>
+                </a:solidFill>
+                <a:sym typeface="Wingdings" panose="05000000000000000000" pitchFamily="2" charset="2"/>
+              </a:rPr>
+              <a:t> 5</a:t>
+            </a:r>
+            <a:endParaRPr lang="en-US" dirty="0"/>
+          </a:p>
+        </p:txBody>
+      </p:sp>
+      <p:pic>
+        <p:nvPicPr>
+          <p:cNvPr id="19" name="Inhaltsplatzhalter 18">
+            <a:extLst>
+              <a:ext uri="{FF2B5EF4-FFF2-40B4-BE49-F238E27FC236}">
+                <a16:creationId xmlns:a16="http://schemas.microsoft.com/office/drawing/2014/main" id="{F6FBFE01-7BBE-9500-0BE1-6A0141966B84}"/>
+              </a:ext>
+            </a:extLst>
+          </p:cNvPr>
+          <p:cNvPicPr>
+            <a:picLocks noGrp="1" noChangeAspect="1"/>
+          </p:cNvPicPr>
+          <p:nvPr>
+            <p:ph sz="half" idx="2"/>
+          </p:nvPr>
+        </p:nvPicPr>
+        <p:blipFill rotWithShape="1">
+          <a:blip r:embed="rId3"/>
+          <a:srcRect l="5039" t="8938" r="5120" b="7933"/>
+          <a:stretch/>
+        </p:blipFill>
+        <p:spPr>
+          <a:xfrm>
+            <a:off x="362464" y="2330259"/>
+            <a:ext cx="6009131" cy="3704781"/>
+          </a:xfrm>
+        </p:spPr>
+      </p:pic>
+    </p:spTree>
+    <p:extLst>
+      <p:ext uri="{BB962C8B-B14F-4D97-AF65-F5344CB8AC3E}">
+        <p14:creationId xmlns:p14="http://schemas.microsoft.com/office/powerpoint/2010/main" val="3124764479"/>
+      </p:ext>
+    </p:extLst>
+  </p:cSld>
+  <p:clrMapOvr>
+    <a:masterClrMapping/>
+  </p:clrMapOvr>
+</p:sld>
+</file>
+
+<file path=ppt/slides/slide13.xml><?xml version="1.0" encoding="utf-8"?>
+<p:sld xmlns:a="http://schemas.openxmlformats.org/drawingml/2006/main" xmlns:r="http://schemas.openxmlformats.org/officeDocument/2006/relationships" xmlns:p="http://schemas.openxmlformats.org/presentationml/2006/main">
+  <p:cSld>
+    <p:spTree>
+      <p:nvGrpSpPr>
+        <p:cNvPr id="1" name=""/>
+        <p:cNvGrpSpPr/>
+        <p:nvPr/>
+      </p:nvGrpSpPr>
+      <p:grpSpPr>
+        <a:xfrm>
+          <a:off x="0" y="0"/>
+          <a:ext cx="0" cy="0"/>
+          <a:chOff x="0" y="0"/>
+          <a:chExt cx="0" cy="0"/>
+        </a:xfrm>
+      </p:grpSpPr>
+      <p:sp>
+        <p:nvSpPr>
+          <p:cNvPr id="2" name="Titel 1">
+            <a:extLst>
+              <a:ext uri="{FF2B5EF4-FFF2-40B4-BE49-F238E27FC236}">
+                <a16:creationId xmlns:a16="http://schemas.microsoft.com/office/drawing/2014/main" id="{E1D551CD-246D-37B7-56BD-1F3BDB983197}"/>
+              </a:ext>
+            </a:extLst>
+          </p:cNvPr>
+          <p:cNvSpPr>
+            <a:spLocks noGrp="1"/>
+          </p:cNvSpPr>
+          <p:nvPr>
+            <p:ph type="title"/>
+          </p:nvPr>
+        </p:nvSpPr>
+        <p:spPr/>
+        <p:txBody>
+          <a:bodyPr/>
+          <a:lstStyle/>
+          <a:p>
+            <a:r>
+              <a:rPr lang="de-DE" dirty="0"/>
+              <a:t>„</a:t>
+            </a:r>
+            <a:r>
+              <a:rPr lang="de-DE" dirty="0" err="1"/>
+              <a:t>uart</a:t>
+            </a:r>
+            <a:r>
+              <a:rPr lang="de-DE" dirty="0"/>
+              <a:t>“</a:t>
+            </a:r>
+          </a:p>
+        </p:txBody>
+      </p:sp>
+      <p:pic>
+        <p:nvPicPr>
+          <p:cNvPr id="7" name="Inhaltsplatzhalter 6">
+            <a:extLst>
+              <a:ext uri="{FF2B5EF4-FFF2-40B4-BE49-F238E27FC236}">
+                <a16:creationId xmlns:a16="http://schemas.microsoft.com/office/drawing/2014/main" id="{855256EC-BA0D-75B3-AE8B-18A28DCC9B29}"/>
+              </a:ext>
+            </a:extLst>
+          </p:cNvPr>
+          <p:cNvPicPr>
+            <a:picLocks noGrp="1" noChangeAspect="1"/>
+          </p:cNvPicPr>
+          <p:nvPr>
+            <p:ph idx="1"/>
+          </p:nvPr>
+        </p:nvPicPr>
+        <p:blipFill rotWithShape="1">
+          <a:blip r:embed="rId2"/>
+          <a:srcRect l="4745" t="10433" r="5142" b="10144"/>
+          <a:stretch/>
+        </p:blipFill>
+        <p:spPr>
+          <a:xfrm>
+            <a:off x="1209676" y="1737326"/>
+            <a:ext cx="9305924" cy="4386493"/>
+          </a:xfrm>
+        </p:spPr>
+      </p:pic>
+      <p:sp>
+        <p:nvSpPr>
+          <p:cNvPr id="4" name="Datumsplatzhalter 3">
+            <a:extLst>
+              <a:ext uri="{FF2B5EF4-FFF2-40B4-BE49-F238E27FC236}">
+                <a16:creationId xmlns:a16="http://schemas.microsoft.com/office/drawing/2014/main" id="{8C082B4C-E9B6-3076-F913-AEDD9B2C6CF5}"/>
+              </a:ext>
+            </a:extLst>
+          </p:cNvPr>
+          <p:cNvSpPr>
+            <a:spLocks noGrp="1"/>
+          </p:cNvSpPr>
+          <p:nvPr>
+            <p:ph type="dt" sz="half" idx="10"/>
+          </p:nvPr>
+        </p:nvSpPr>
+        <p:spPr/>
+        <p:txBody>
+          <a:bodyPr/>
+          <a:lstStyle/>
+          <a:p>
+            <a:pPr rtl="0"/>
+            <a:fld id="{878708FE-2DD0-4A9D-BF1C-99DA12B2423D}" type="datetime1">
+              <a:rPr lang="de-DE" smtClean="0"/>
+              <a:t>21.01.2023</a:t>
+            </a:fld>
+            <a:endParaRPr lang="en-US"/>
+          </a:p>
+        </p:txBody>
+      </p:sp>
+      <p:sp>
+        <p:nvSpPr>
+          <p:cNvPr id="5" name="Fußzeilenplatzhalter 4">
+            <a:extLst>
+              <a:ext uri="{FF2B5EF4-FFF2-40B4-BE49-F238E27FC236}">
+                <a16:creationId xmlns:a16="http://schemas.microsoft.com/office/drawing/2014/main" id="{3772D7D1-366A-29C6-ED57-166FC0862359}"/>
+              </a:ext>
+            </a:extLst>
+          </p:cNvPr>
+          <p:cNvSpPr>
+            <a:spLocks noGrp="1"/>
+          </p:cNvSpPr>
+          <p:nvPr>
+            <p:ph type="ftr" sz="quarter" idx="11"/>
+          </p:nvPr>
+        </p:nvSpPr>
+        <p:spPr/>
+        <p:txBody>
+          <a:bodyPr/>
+          <a:lstStyle/>
+          <a:p>
+            <a:pPr rtl="0"/>
+            <a:r>
+              <a:rPr lang="de-DE" dirty="0"/>
+              <a:t>Abbildung x: Aus </a:t>
+            </a:r>
+            <a:r>
+              <a:rPr lang="de-DE" dirty="0">
+                <a:solidFill>
+                  <a:schemeClr val="tx1"/>
+                </a:solidFill>
+              </a:rPr>
+              <a:t>„</a:t>
+            </a:r>
+            <a:r>
+              <a:rPr lang="de-DE" dirty="0" err="1">
+                <a:solidFill>
+                  <a:schemeClr val="tx1"/>
+                </a:solidFill>
+              </a:rPr>
+              <a:t>uart.c</a:t>
+            </a:r>
+            <a:r>
+              <a:rPr lang="de-DE" dirty="0">
+                <a:solidFill>
+                  <a:schemeClr val="tx1"/>
+                </a:solidFill>
+              </a:rPr>
+              <a:t>“ </a:t>
+            </a:r>
+            <a:r>
+              <a:rPr lang="de-DE" dirty="0">
+                <a:solidFill>
+                  <a:schemeClr val="tx1"/>
+                </a:solidFill>
+                <a:sym typeface="Wingdings" panose="05000000000000000000" pitchFamily="2" charset="2"/>
+              </a:rPr>
+              <a:t> Screen </a:t>
+            </a:r>
+            <a:r>
+              <a:rPr lang="de-DE" dirty="0" err="1">
+                <a:solidFill>
+                  <a:schemeClr val="tx1"/>
+                </a:solidFill>
+                <a:sym typeface="Wingdings" panose="05000000000000000000" pitchFamily="2" charset="2"/>
+              </a:rPr>
+              <a:t>shot</a:t>
+            </a:r>
+            <a:r>
+              <a:rPr lang="de-DE" dirty="0">
+                <a:solidFill>
+                  <a:schemeClr val="tx1"/>
+                </a:solidFill>
+                <a:sym typeface="Wingdings" panose="05000000000000000000" pitchFamily="2" charset="2"/>
+              </a:rPr>
+              <a:t> 8</a:t>
+            </a:r>
+            <a:endParaRPr lang="en-US" dirty="0"/>
+          </a:p>
+        </p:txBody>
+      </p:sp>
+    </p:spTree>
+    <p:extLst>
+      <p:ext uri="{BB962C8B-B14F-4D97-AF65-F5344CB8AC3E}">
+        <p14:creationId xmlns:p14="http://schemas.microsoft.com/office/powerpoint/2010/main" val="2781407800"/>
+      </p:ext>
+    </p:extLst>
+  </p:cSld>
+  <p:clrMapOvr>
+    <a:masterClrMapping/>
+  </p:clrMapOvr>
+</p:sld>
+</file>
+
+<file path=ppt/slides/slide14.xml><?xml version="1.0" encoding="utf-8"?>
+<p:sld xmlns:a="http://schemas.openxmlformats.org/drawingml/2006/main" xmlns:r="http://schemas.openxmlformats.org/officeDocument/2006/relationships" xmlns:p="http://schemas.openxmlformats.org/presentationml/2006/main">
+  <p:cSld>
+    <p:spTree>
+      <p:nvGrpSpPr>
+        <p:cNvPr id="1" name=""/>
+        <p:cNvGrpSpPr/>
+        <p:nvPr/>
+      </p:nvGrpSpPr>
+      <p:grpSpPr>
+        <a:xfrm>
+          <a:off x="0" y="0"/>
+          <a:ext cx="0" cy="0"/>
+          <a:chOff x="0" y="0"/>
+          <a:chExt cx="0" cy="0"/>
+        </a:xfrm>
+      </p:grpSpPr>
+      <p:sp>
+        <p:nvSpPr>
+          <p:cNvPr id="2" name="Titel 1">
+            <a:extLst>
+              <a:ext uri="{FF2B5EF4-FFF2-40B4-BE49-F238E27FC236}">
+                <a16:creationId xmlns:a16="http://schemas.microsoft.com/office/drawing/2014/main" id="{DE6376E1-5A2B-7645-C09C-D94EAE0BD5F0}"/>
+              </a:ext>
+            </a:extLst>
+          </p:cNvPr>
+          <p:cNvSpPr>
+            <a:spLocks noGrp="1"/>
+          </p:cNvSpPr>
+          <p:nvPr>
+            <p:ph type="title"/>
+          </p:nvPr>
+        </p:nvSpPr>
+        <p:spPr/>
+        <p:txBody>
+          <a:bodyPr/>
+          <a:lstStyle/>
+          <a:p>
+            <a:r>
+              <a:rPr lang="de-DE" dirty="0"/>
+              <a:t>„</a:t>
+            </a:r>
+            <a:r>
+              <a:rPr lang="de-DE" dirty="0" err="1"/>
+              <a:t>main</a:t>
+            </a:r>
+            <a:r>
+              <a:rPr lang="de-DE" dirty="0"/>
+              <a:t>“</a:t>
+            </a:r>
+          </a:p>
+        </p:txBody>
+      </p:sp>
+      <p:pic>
+        <p:nvPicPr>
+          <p:cNvPr id="7" name="Inhaltsplatzhalter 6">
+            <a:extLst>
+              <a:ext uri="{FF2B5EF4-FFF2-40B4-BE49-F238E27FC236}">
+                <a16:creationId xmlns:a16="http://schemas.microsoft.com/office/drawing/2014/main" id="{A1BB2E38-D7CA-7288-4D5E-F3A81A3937BB}"/>
+              </a:ext>
+            </a:extLst>
+          </p:cNvPr>
+          <p:cNvPicPr>
+            <a:picLocks noGrp="1" noChangeAspect="1"/>
+          </p:cNvPicPr>
+          <p:nvPr>
+            <p:ph idx="1"/>
+          </p:nvPr>
+        </p:nvPicPr>
+        <p:blipFill rotWithShape="1">
+          <a:blip r:embed="rId2"/>
+          <a:srcRect l="4308" t="8701" r="4574" b="7917"/>
+          <a:stretch/>
+        </p:blipFill>
+        <p:spPr>
+          <a:xfrm>
+            <a:off x="1228725" y="1633247"/>
+            <a:ext cx="9220199" cy="4529455"/>
+          </a:xfrm>
+        </p:spPr>
+      </p:pic>
+      <p:sp>
+        <p:nvSpPr>
+          <p:cNvPr id="4" name="Datumsplatzhalter 3">
+            <a:extLst>
+              <a:ext uri="{FF2B5EF4-FFF2-40B4-BE49-F238E27FC236}">
+                <a16:creationId xmlns:a16="http://schemas.microsoft.com/office/drawing/2014/main" id="{F58ED5E4-F87D-5DE6-288A-6FBBD7B1B8FD}"/>
+              </a:ext>
+            </a:extLst>
+          </p:cNvPr>
+          <p:cNvSpPr>
+            <a:spLocks noGrp="1"/>
+          </p:cNvSpPr>
+          <p:nvPr>
+            <p:ph type="dt" sz="half" idx="10"/>
+          </p:nvPr>
+        </p:nvSpPr>
+        <p:spPr/>
+        <p:txBody>
+          <a:bodyPr/>
+          <a:lstStyle/>
+          <a:p>
+            <a:pPr rtl="0"/>
+            <a:fld id="{878708FE-2DD0-4A9D-BF1C-99DA12B2423D}" type="datetime1">
+              <a:rPr lang="de-DE" smtClean="0"/>
+              <a:t>21.01.2023</a:t>
+            </a:fld>
+            <a:endParaRPr lang="en-US"/>
+          </a:p>
+        </p:txBody>
+      </p:sp>
+      <p:sp>
+        <p:nvSpPr>
+          <p:cNvPr id="5" name="Fußzeilenplatzhalter 4">
+            <a:extLst>
+              <a:ext uri="{FF2B5EF4-FFF2-40B4-BE49-F238E27FC236}">
+                <a16:creationId xmlns:a16="http://schemas.microsoft.com/office/drawing/2014/main" id="{27E394F8-F660-14C7-A81D-54A3431041F0}"/>
+              </a:ext>
+            </a:extLst>
+          </p:cNvPr>
+          <p:cNvSpPr>
+            <a:spLocks noGrp="1"/>
+          </p:cNvSpPr>
+          <p:nvPr>
+            <p:ph type="ftr" sz="quarter" idx="11"/>
+          </p:nvPr>
+        </p:nvSpPr>
+        <p:spPr/>
+        <p:txBody>
+          <a:bodyPr/>
+          <a:lstStyle/>
+          <a:p>
+            <a:pPr rtl="0"/>
+            <a:r>
+              <a:rPr lang="de-DE" dirty="0"/>
+              <a:t>Abbildung x: Aus </a:t>
+            </a:r>
+            <a:r>
+              <a:rPr lang="de-DE" dirty="0">
+                <a:solidFill>
+                  <a:schemeClr val="tx1"/>
+                </a:solidFill>
+              </a:rPr>
+              <a:t>„</a:t>
+            </a:r>
+            <a:r>
+              <a:rPr lang="de-DE" dirty="0" err="1">
+                <a:solidFill>
+                  <a:schemeClr val="tx1"/>
+                </a:solidFill>
+              </a:rPr>
+              <a:t>main.c</a:t>
+            </a:r>
+            <a:r>
+              <a:rPr lang="de-DE" dirty="0">
+                <a:solidFill>
+                  <a:schemeClr val="tx1"/>
+                </a:solidFill>
+              </a:rPr>
+              <a:t>“</a:t>
+            </a:r>
+            <a:endParaRPr lang="en-US" dirty="0"/>
+          </a:p>
+        </p:txBody>
+      </p:sp>
+    </p:spTree>
+    <p:extLst>
+      <p:ext uri="{BB962C8B-B14F-4D97-AF65-F5344CB8AC3E}">
+        <p14:creationId xmlns:p14="http://schemas.microsoft.com/office/powerpoint/2010/main" val="3371315758"/>
+      </p:ext>
+    </p:extLst>
+  </p:cSld>
+  <p:clrMapOvr>
+    <a:masterClrMapping/>
+  </p:clrMapOvr>
+</p:sld>
+</file>
+
+<file path=ppt/slides/slide15.xml><?xml version="1.0" encoding="utf-8"?>
+<p:sld xmlns:a="http://schemas.openxmlformats.org/drawingml/2006/main" xmlns:r="http://schemas.openxmlformats.org/officeDocument/2006/relationships" xmlns:p="http://schemas.openxmlformats.org/presentationml/2006/main">
+  <p:cSld>
+    <p:spTree>
+      <p:nvGrpSpPr>
+        <p:cNvPr id="1" name=""/>
+        <p:cNvGrpSpPr/>
+        <p:nvPr/>
+      </p:nvGrpSpPr>
+      <p:grpSpPr>
+        <a:xfrm>
+          <a:off x="0" y="0"/>
+          <a:ext cx="0" cy="0"/>
+          <a:chOff x="0" y="0"/>
+          <a:chExt cx="0" cy="0"/>
+        </a:xfrm>
+      </p:grpSpPr>
+      <p:sp>
+        <p:nvSpPr>
+          <p:cNvPr id="2" name="Titel 1">
+            <a:extLst>
+              <a:ext uri="{FF2B5EF4-FFF2-40B4-BE49-F238E27FC236}">
+                <a16:creationId xmlns:a16="http://schemas.microsoft.com/office/drawing/2014/main" id="{3AF69C2D-A057-5049-3306-96690A618E65}"/>
+              </a:ext>
+            </a:extLst>
+          </p:cNvPr>
+          <p:cNvSpPr>
+            <a:spLocks noGrp="1"/>
+          </p:cNvSpPr>
+          <p:nvPr>
+            <p:ph type="title"/>
+          </p:nvPr>
+        </p:nvSpPr>
+        <p:spPr/>
+        <p:txBody>
+          <a:bodyPr/>
+          <a:lstStyle/>
+          <a:p>
+            <a:r>
+              <a:rPr lang="de-DE" dirty="0"/>
+              <a:t>Erkenntnis</a:t>
+            </a:r>
+          </a:p>
+        </p:txBody>
+      </p:sp>
+      <p:sp>
+        <p:nvSpPr>
+          <p:cNvPr id="3" name="Inhaltsplatzhalter 2">
+            <a:extLst>
+              <a:ext uri="{FF2B5EF4-FFF2-40B4-BE49-F238E27FC236}">
+                <a16:creationId xmlns:a16="http://schemas.microsoft.com/office/drawing/2014/main" id="{CB54A7FC-7954-9B53-52AD-4F6240DB7E7B}"/>
+              </a:ext>
+            </a:extLst>
+          </p:cNvPr>
+          <p:cNvSpPr>
+            <a:spLocks noGrp="1"/>
+          </p:cNvSpPr>
+          <p:nvPr>
+            <p:ph idx="1"/>
+          </p:nvPr>
+        </p:nvSpPr>
+        <p:spPr/>
+        <p:txBody>
+          <a:bodyPr/>
+          <a:lstStyle/>
+          <a:p>
+            <a:r>
+              <a:rPr lang="de-DE" dirty="0" err="1"/>
+              <a:t>Struktuierung</a:t>
+            </a:r>
+            <a:r>
+              <a:rPr lang="de-DE" dirty="0"/>
+              <a:t> von C-Code</a:t>
+            </a:r>
+          </a:p>
+          <a:p>
+            <a:r>
+              <a:rPr lang="de-DE" dirty="0"/>
+              <a:t>Einbinden von Dateien</a:t>
+            </a:r>
+          </a:p>
+          <a:p>
+            <a:r>
+              <a:rPr lang="de-DE" dirty="0"/>
+              <a:t>Skop</a:t>
+            </a:r>
+          </a:p>
+          <a:p>
+            <a:r>
+              <a:rPr lang="de-DE" dirty="0" err="1"/>
+              <a:t>Timer</a:t>
+            </a:r>
+            <a:endParaRPr lang="de-DE" dirty="0"/>
+          </a:p>
+          <a:p>
+            <a:r>
+              <a:rPr lang="de-DE" dirty="0"/>
+              <a:t>Interrupt</a:t>
+            </a:r>
+          </a:p>
+        </p:txBody>
+      </p:sp>
+      <p:sp>
+        <p:nvSpPr>
+          <p:cNvPr id="4" name="Datumsplatzhalter 3">
+            <a:extLst>
+              <a:ext uri="{FF2B5EF4-FFF2-40B4-BE49-F238E27FC236}">
+                <a16:creationId xmlns:a16="http://schemas.microsoft.com/office/drawing/2014/main" id="{EA5202A6-BEB8-D016-EB5D-26973D93BBBD}"/>
+              </a:ext>
+            </a:extLst>
+          </p:cNvPr>
+          <p:cNvSpPr>
+            <a:spLocks noGrp="1"/>
+          </p:cNvSpPr>
+          <p:nvPr>
+            <p:ph type="dt" sz="half" idx="10"/>
+          </p:nvPr>
+        </p:nvSpPr>
+        <p:spPr/>
+        <p:txBody>
+          <a:bodyPr/>
+          <a:lstStyle/>
+          <a:p>
+            <a:pPr rtl="0"/>
+            <a:fld id="{878708FE-2DD0-4A9D-BF1C-99DA12B2423D}" type="datetime1">
+              <a:rPr lang="de-DE" smtClean="0"/>
+              <a:t>21.01.2023</a:t>
+            </a:fld>
+            <a:endParaRPr lang="en-US"/>
+          </a:p>
+        </p:txBody>
+      </p:sp>
+      <p:sp>
+        <p:nvSpPr>
+          <p:cNvPr id="5" name="Fußzeilenplatzhalter 4">
+            <a:extLst>
+              <a:ext uri="{FF2B5EF4-FFF2-40B4-BE49-F238E27FC236}">
+                <a16:creationId xmlns:a16="http://schemas.microsoft.com/office/drawing/2014/main" id="{6C9B2FEB-6C69-A043-FB1E-D7244235DE21}"/>
+              </a:ext>
+            </a:extLst>
+          </p:cNvPr>
+          <p:cNvSpPr>
+            <a:spLocks noGrp="1"/>
+          </p:cNvSpPr>
+          <p:nvPr>
+            <p:ph type="ftr" sz="quarter" idx="11"/>
+          </p:nvPr>
+        </p:nvSpPr>
+        <p:spPr/>
+        <p:txBody>
+          <a:bodyPr/>
+          <a:lstStyle/>
+          <a:p>
+            <a:pPr rtl="0"/>
+            <a:r>
+              <a:rPr lang="de-DE"/>
+              <a:t>Abbildung 1: https://www.komputer.de/zen/index.php?main_page=product_info&amp;products_id=150</a:t>
+            </a:r>
+            <a:endParaRPr lang="en-US"/>
+          </a:p>
+        </p:txBody>
+      </p:sp>
+    </p:spTree>
+    <p:extLst>
+      <p:ext uri="{BB962C8B-B14F-4D97-AF65-F5344CB8AC3E}">
+        <p14:creationId xmlns:p14="http://schemas.microsoft.com/office/powerpoint/2010/main" val="796811978"/>
+      </p:ext>
+    </p:extLst>
+  </p:cSld>
+  <p:clrMapOvr>
+    <a:masterClrMapping/>
+  </p:clrMapOvr>
+</p:sld>
+</file>
+
+<file path=ppt/slides/slide16.xml><?xml version="1.0" encoding="utf-8"?>
+<p:sld xmlns:a="http://schemas.openxmlformats.org/drawingml/2006/main" xmlns:r="http://schemas.openxmlformats.org/officeDocument/2006/relationships" xmlns:p="http://schemas.openxmlformats.org/presentationml/2006/main">
+  <p:cSld>
+    <p:spTree>
+      <p:nvGrpSpPr>
+        <p:cNvPr id="1" name=""/>
+        <p:cNvGrpSpPr/>
+        <p:nvPr/>
+      </p:nvGrpSpPr>
+      <p:grpSpPr>
+        <a:xfrm>
+          <a:off x="0" y="0"/>
+          <a:ext cx="0" cy="0"/>
+          <a:chOff x="0" y="0"/>
+          <a:chExt cx="0" cy="0"/>
+        </a:xfrm>
+      </p:grpSpPr>
+      <p:sp>
+        <p:nvSpPr>
+          <p:cNvPr id="2" name="Titel 1">
+            <a:extLst>
+              <a:ext uri="{FF2B5EF4-FFF2-40B4-BE49-F238E27FC236}">
+                <a16:creationId xmlns:a16="http://schemas.microsoft.com/office/drawing/2014/main" id="{3B1A9BDC-D87D-C3C4-EE35-0284E924355F}"/>
+              </a:ext>
+            </a:extLst>
+          </p:cNvPr>
+          <p:cNvSpPr>
+            <a:spLocks noGrp="1"/>
+          </p:cNvSpPr>
+          <p:nvPr>
+            <p:ph type="title"/>
+          </p:nvPr>
+        </p:nvSpPr>
+        <p:spPr/>
+        <p:txBody>
+          <a:bodyPr/>
+          <a:lstStyle/>
+          <a:p>
+            <a:r>
+              <a:rPr lang="de-DE" dirty="0"/>
+              <a:t>Quellen</a:t>
+            </a:r>
+          </a:p>
+        </p:txBody>
+      </p:sp>
+      <p:sp>
+        <p:nvSpPr>
+          <p:cNvPr id="3" name="Inhaltsplatzhalter 2">
+            <a:extLst>
+              <a:ext uri="{FF2B5EF4-FFF2-40B4-BE49-F238E27FC236}">
+                <a16:creationId xmlns:a16="http://schemas.microsoft.com/office/drawing/2014/main" id="{181079F4-4937-A86C-B767-776E0F401B08}"/>
+              </a:ext>
+            </a:extLst>
+          </p:cNvPr>
+          <p:cNvSpPr>
+            <a:spLocks noGrp="1"/>
+          </p:cNvSpPr>
+          <p:nvPr>
+            <p:ph idx="1"/>
+          </p:nvPr>
+        </p:nvSpPr>
+        <p:spPr/>
+        <p:txBody>
+          <a:bodyPr/>
+          <a:lstStyle/>
+          <a:p>
+            <a:pPr rtl="0"/>
+            <a:r>
+              <a:rPr lang="de-DE" dirty="0"/>
+              <a:t>Abbildung 1: </a:t>
+            </a:r>
+            <a:r>
+              <a:rPr lang="de-DE" dirty="0">
+                <a:hlinkClick r:id="rId2"/>
+              </a:rPr>
+              <a:t>https://www.komputer.de/zen/index.php?main_page=product_info&amp;products_id=150</a:t>
+            </a:r>
+            <a:endParaRPr lang="de-DE" dirty="0"/>
+          </a:p>
+          <a:p>
+            <a:pPr rtl="0"/>
+            <a:r>
+              <a:rPr lang="de-DE" dirty="0"/>
+              <a:t>Abbildung</a:t>
+            </a:r>
+            <a:r>
+              <a:rPr lang="en-US" dirty="0"/>
+              <a:t> 2: </a:t>
+            </a:r>
+            <a:r>
+              <a:rPr lang="en-US" dirty="0">
+                <a:hlinkClick r:id="rId3"/>
+              </a:rPr>
+              <a:t>https://lastminuteengineers.com/oled-display-esp8266-tutorial/</a:t>
+            </a:r>
+            <a:endParaRPr lang="en-US" dirty="0"/>
+          </a:p>
+          <a:p>
+            <a:pPr rtl="0"/>
+            <a:r>
+              <a:rPr lang="en-US" dirty="0" err="1"/>
+              <a:t>Abbildung</a:t>
+            </a:r>
+            <a:r>
+              <a:rPr lang="en-US" dirty="0"/>
+              <a:t> 3: </a:t>
+            </a:r>
+            <a:r>
+              <a:rPr lang="en-US" dirty="0">
+                <a:hlinkClick r:id="rId4"/>
+              </a:rPr>
+              <a:t>https://www.alliedelec.com/product/microchip-technology-inc-/dspic33fj128gp802-i-sp/70413842/</a:t>
+            </a:r>
+            <a:endParaRPr lang="en-US" dirty="0"/>
+          </a:p>
+          <a:p>
+            <a:pPr rtl="0"/>
+            <a:r>
+              <a:rPr lang="de-DE" dirty="0"/>
+              <a:t>OLED-Code: Jan </a:t>
+            </a:r>
+            <a:r>
+              <a:rPr lang="de-DE" dirty="0" err="1"/>
+              <a:t>Hoffmüller</a:t>
+            </a:r>
+            <a:r>
+              <a:rPr lang="de-DE" dirty="0"/>
+              <a:t> (</a:t>
+            </a:r>
+            <a:r>
+              <a:rPr lang="de-DE" dirty="0" err="1"/>
+              <a:t>Moodle</a:t>
+            </a:r>
+            <a:r>
+              <a:rPr lang="de-DE" dirty="0"/>
+              <a:t>-Kurs)</a:t>
+            </a:r>
+          </a:p>
+          <a:p>
+            <a:r>
+              <a:rPr lang="de-DE" dirty="0"/>
+              <a:t>UART-Code: Jan </a:t>
+            </a:r>
+            <a:r>
+              <a:rPr lang="de-DE" dirty="0" err="1"/>
+              <a:t>Hoffmüller</a:t>
+            </a:r>
+            <a:r>
+              <a:rPr lang="de-DE" dirty="0"/>
+              <a:t> (</a:t>
+            </a:r>
+            <a:r>
+              <a:rPr lang="de-DE" dirty="0" err="1"/>
+              <a:t>Moodle</a:t>
+            </a:r>
+            <a:r>
+              <a:rPr lang="de-DE" dirty="0"/>
+              <a:t>-Kurs)</a:t>
+            </a:r>
+          </a:p>
+          <a:p>
+            <a:r>
+              <a:rPr lang="de-DE" dirty="0"/>
+              <a:t>Datenblatt dsPIC33FJ128GP802</a:t>
+            </a:r>
+          </a:p>
+          <a:p>
+            <a:r>
+              <a:rPr lang="de-DE" dirty="0"/>
+              <a:t>Datenblatt DHT22 </a:t>
+            </a:r>
+            <a:r>
+              <a:rPr lang="de-DE" dirty="0">
+                <a:hlinkClick r:id="rId5"/>
+              </a:rPr>
+              <a:t>https://cdn-shop.adafruit.com/datasheets/Digital+humidity+and+temperature+sensor+AM2302.pdf</a:t>
+            </a:r>
+            <a:endParaRPr lang="de-DE" dirty="0"/>
+          </a:p>
+          <a:p>
+            <a:r>
+              <a:rPr lang="de-DE" dirty="0"/>
+              <a:t>Alle Code </a:t>
+            </a:r>
+            <a:r>
+              <a:rPr lang="de-DE" dirty="0" err="1"/>
+              <a:t>abbildungen</a:t>
+            </a:r>
+            <a:r>
+              <a:rPr lang="de-DE" dirty="0"/>
+              <a:t> stammen aus unserem Programm</a:t>
+            </a:r>
+          </a:p>
+          <a:p>
+            <a:endParaRPr lang="de-DE" dirty="0"/>
+          </a:p>
+        </p:txBody>
+      </p:sp>
+      <p:sp>
+        <p:nvSpPr>
+          <p:cNvPr id="4" name="Datumsplatzhalter 3">
+            <a:extLst>
+              <a:ext uri="{FF2B5EF4-FFF2-40B4-BE49-F238E27FC236}">
+                <a16:creationId xmlns:a16="http://schemas.microsoft.com/office/drawing/2014/main" id="{893D3560-17B0-DDE1-185F-97588F2CA633}"/>
+              </a:ext>
+            </a:extLst>
+          </p:cNvPr>
+          <p:cNvSpPr>
+            <a:spLocks noGrp="1"/>
+          </p:cNvSpPr>
+          <p:nvPr>
+            <p:ph type="dt" sz="half" idx="10"/>
+          </p:nvPr>
+        </p:nvSpPr>
+        <p:spPr/>
+        <p:txBody>
+          <a:bodyPr/>
+          <a:lstStyle/>
+          <a:p>
+            <a:pPr rtl="0"/>
+            <a:fld id="{4C657CFF-1C6E-431E-9FB2-FBE8C4A16694}" type="datetime1">
+              <a:rPr lang="de-DE" smtClean="0"/>
+              <a:t>21.01.2023</a:t>
+            </a:fld>
+            <a:endParaRPr lang="en-US"/>
+          </a:p>
+        </p:txBody>
+      </p:sp>
+      <p:sp>
+        <p:nvSpPr>
+          <p:cNvPr id="5" name="Fußzeilenplatzhalter 4">
+            <a:extLst>
+              <a:ext uri="{FF2B5EF4-FFF2-40B4-BE49-F238E27FC236}">
+                <a16:creationId xmlns:a16="http://schemas.microsoft.com/office/drawing/2014/main" id="{66C1DDA6-C195-BD30-362F-0EFB63D3B415}"/>
+              </a:ext>
+            </a:extLst>
+          </p:cNvPr>
+          <p:cNvSpPr>
+            <a:spLocks noGrp="1"/>
+          </p:cNvSpPr>
+          <p:nvPr>
+            <p:ph type="ftr" sz="quarter" idx="11"/>
+          </p:nvPr>
+        </p:nvSpPr>
+        <p:spPr/>
+        <p:txBody>
+          <a:bodyPr/>
+          <a:lstStyle/>
+          <a:p>
+            <a:pPr rtl="0"/>
+            <a:r>
+              <a:rPr lang="de-DE"/>
+              <a:t>Abbildung 1: https://www.komputer.de/zen/index.php?main_page=product_info&amp;products_id=150</a:t>
+            </a:r>
+            <a:endParaRPr lang="en-US"/>
+          </a:p>
+        </p:txBody>
+      </p:sp>
+    </p:spTree>
+    <p:extLst>
+      <p:ext uri="{BB962C8B-B14F-4D97-AF65-F5344CB8AC3E}">
+        <p14:creationId xmlns:p14="http://schemas.microsoft.com/office/powerpoint/2010/main" val="2515272364"/>
+      </p:ext>
+    </p:extLst>
+  </p:cSld>
+  <p:clrMapOvr>
+    <a:masterClrMapping/>
+  </p:clrMapOvr>
+</p:sld>
+</file>
+
 <file path=ppt/slides/slide2.xml><?xml version="1.0" encoding="utf-8"?>
 <p:sld xmlns:a="http://schemas.openxmlformats.org/drawingml/2006/main" xmlns:r="http://schemas.openxmlformats.org/officeDocument/2006/relationships" xmlns:p="http://schemas.openxmlformats.org/presentationml/2006/main">
   <p:cSld>
@@ -5585,7 +7312,17 @@
             </a:r>
             <a:r>
               <a:rPr lang="en-US" dirty="0"/>
-              <a:t> 3: https://www.alliedelec.com/product/microchip-technology-inc-/dspic33fj128gp802-i-sp/70413842/</a:t>
+              <a:t> 3: </a:t>
+            </a:r>
+            <a:r>
+              <a:rPr lang="en-US" dirty="0">
+                <a:hlinkClick r:id="rId5"/>
+              </a:rPr>
+              <a:t>https://www.alliedelec.com/product/microchip-technology-inc-/dspic33fj128gp802-i-sp/70413842/</a:t>
+            </a:r>
+            <a:r>
+              <a:rPr lang="en-US" dirty="0"/>
+              <a:t> </a:t>
             </a:r>
           </a:p>
         </p:txBody>
@@ -5640,7 +7377,7 @@
           <p:nvPr/>
         </p:nvPicPr>
         <p:blipFill>
-          <a:blip r:embed="rId5">
+          <a:blip r:embed="rId6">
             <a:extLst>
               <a:ext uri="{28A0092B-C50C-407E-A947-70E740481C1C}">
                 <a14:useLocalDpi xmlns:a14="http://schemas.microsoft.com/office/drawing/2010/main" val="0"/>
@@ -5653,7 +7390,7 @@
         </p:blipFill>
         <p:spPr>
           <a:xfrm>
-            <a:off x="8739553" y="2531313"/>
+            <a:off x="8621270" y="2910854"/>
             <a:ext cx="1990725" cy="1990725"/>
           </a:xfrm>
           <a:prstGeom prst="rect">
@@ -5675,7 +7412,7 @@
         </p:nvSpPr>
         <p:spPr>
           <a:xfrm>
-            <a:off x="10149839" y="4487734"/>
+            <a:off x="8503541" y="4974997"/>
             <a:ext cx="1043609" cy="215444"/>
           </a:xfrm>
           <a:prstGeom prst="rect">
@@ -5711,7 +7448,7 @@
           <p:nvPr/>
         </p:nvPicPr>
         <p:blipFill>
-          <a:blip r:embed="rId6">
+          <a:blip r:embed="rId7">
             <a:extLst>
               <a:ext uri="{28A0092B-C50C-407E-A947-70E740481C1C}">
                 <a14:useLocalDpi xmlns:a14="http://schemas.microsoft.com/office/drawing/2010/main" val="0"/>
@@ -6013,10 +7750,10 @@
           <a:p>
             <a:pPr rtl="0"/>
             <a:r>
-              <a:rPr lang="de-DE"/>
-              <a:t>Abbildung 1: https://www.komputer.de/zen/index.php?main_page=product_info&amp;products_id=150</a:t>
-            </a:r>
-            <a:endParaRPr lang="en-US"/>
+              <a:rPr lang="de-DE" dirty="0"/>
+              <a:t>Abbildung 1:</a:t>
+            </a:r>
+            <a:endParaRPr lang="en-US" dirty="0"/>
           </a:p>
         </p:txBody>
       </p:sp>
@@ -6256,10 +7993,91 @@
           <a:p>
             <a:pPr rtl="0"/>
             <a:r>
-              <a:rPr lang="de-DE"/>
-              <a:t>Abbildung 1: https://www.komputer.de/zen/index.php?main_page=product_info&amp;products_id=150</a:t>
-            </a:r>
-            <a:endParaRPr lang="en-US"/>
+              <a:rPr lang="en-US" dirty="0" err="1"/>
+              <a:t>Abbildung</a:t>
+            </a:r>
+            <a:r>
+              <a:rPr lang="en-US" dirty="0"/>
+              <a:t> 3: </a:t>
+            </a:r>
+            <a:r>
+              <a:rPr lang="en-US" dirty="0">
+                <a:hlinkClick r:id="rId2"/>
+              </a:rPr>
+              <a:t>https://www.alliedelec.com/product/microchip-technology-inc-/dspic33fj128gp802-i-sp/70413842/</a:t>
+            </a:r>
+            <a:endParaRPr lang="en-US" dirty="0"/>
+          </a:p>
+        </p:txBody>
+      </p:sp>
+      <p:pic>
+        <p:nvPicPr>
+          <p:cNvPr id="6" name="Grafik 5" descr="Ein Bild, das Text, Elektronik, Schaltkreis enthält.&#10;&#10;Automatisch generierte Beschreibung">
+            <a:extLst>
+              <a:ext uri="{FF2B5EF4-FFF2-40B4-BE49-F238E27FC236}">
+                <a16:creationId xmlns:a16="http://schemas.microsoft.com/office/drawing/2014/main" id="{1A2B36CF-8BFC-FE98-BBB0-28F8AA49C893}"/>
+              </a:ext>
+            </a:extLst>
+          </p:cNvPr>
+          <p:cNvPicPr>
+            <a:picLocks noChangeAspect="1"/>
+          </p:cNvPicPr>
+          <p:nvPr/>
+        </p:nvPicPr>
+        <p:blipFill>
+          <a:blip r:embed="rId3">
+            <a:extLst>
+              <a:ext uri="{28A0092B-C50C-407E-A947-70E740481C1C}">
+                <a14:useLocalDpi xmlns:a14="http://schemas.microsoft.com/office/drawing/2010/main" val="0"/>
+              </a:ext>
+            </a:extLst>
+          </a:blip>
+          <a:stretch>
+            <a:fillRect/>
+          </a:stretch>
+        </p:blipFill>
+        <p:spPr>
+          <a:xfrm>
+            <a:off x="8109575" y="830802"/>
+            <a:ext cx="1836284" cy="1836284"/>
+          </a:xfrm>
+          <a:prstGeom prst="rect">
+            <a:avLst/>
+          </a:prstGeom>
+        </p:spPr>
+      </p:pic>
+      <p:sp>
+        <p:nvSpPr>
+          <p:cNvPr id="7" name="Textfeld 6">
+            <a:extLst>
+              <a:ext uri="{FF2B5EF4-FFF2-40B4-BE49-F238E27FC236}">
+                <a16:creationId xmlns:a16="http://schemas.microsoft.com/office/drawing/2014/main" id="{A190C8D3-128C-4571-3751-48F882CED087}"/>
+              </a:ext>
+            </a:extLst>
+          </p:cNvPr>
+          <p:cNvSpPr txBox="1"/>
+          <p:nvPr/>
+        </p:nvSpPr>
+        <p:spPr>
+          <a:xfrm>
+            <a:off x="8159183" y="2439239"/>
+            <a:ext cx="1561672" cy="215444"/>
+          </a:xfrm>
+          <a:prstGeom prst="rect">
+            <a:avLst/>
+          </a:prstGeom>
+          <a:noFill/>
+        </p:spPr>
+        <p:txBody>
+          <a:bodyPr wrap="square" rtlCol="0">
+            <a:spAutoFit/>
+          </a:bodyPr>
+          <a:lstStyle/>
+          <a:p>
+            <a:r>
+              <a:rPr lang="de-DE" sz="800" dirty="0"/>
+              <a:t>Abbildung 3</a:t>
+            </a:r>
           </a:p>
         </p:txBody>
       </p:sp>
@@ -6504,10 +8322,90 @@
           <a:p>
             <a:pPr rtl="0"/>
             <a:r>
-              <a:rPr lang="de-DE"/>
-              <a:t>Abbildung 1: https://www.komputer.de/zen/index.php?main_page=product_info&amp;products_id=150</a:t>
-            </a:r>
-            <a:endParaRPr lang="en-US"/>
+              <a:rPr lang="de-DE" dirty="0"/>
+              <a:t>Abbildung 1: </a:t>
+            </a:r>
+            <a:r>
+              <a:rPr lang="de-DE" dirty="0">
+                <a:hlinkClick r:id="rId2"/>
+              </a:rPr>
+              <a:t>https://www.komputer.de/zen/index.php?main_page=product_info&amp;products_id=150</a:t>
+            </a:r>
+            <a:endParaRPr lang="en-US" dirty="0"/>
+          </a:p>
+        </p:txBody>
+      </p:sp>
+      <p:pic>
+        <p:nvPicPr>
+          <p:cNvPr id="6" name="Grafik 5">
+            <a:extLst>
+              <a:ext uri="{FF2B5EF4-FFF2-40B4-BE49-F238E27FC236}">
+                <a16:creationId xmlns:a16="http://schemas.microsoft.com/office/drawing/2014/main" id="{5DB26953-E671-1E68-DE25-338B8B669982}"/>
+              </a:ext>
+              <a:ext uri="{C183D7F6-B498-43B3-948B-1728B52AA6E4}">
+                <adec:decorative xmlns:adec="http://schemas.microsoft.com/office/drawing/2017/decorative" val="1"/>
+              </a:ext>
+            </a:extLst>
+          </p:cNvPr>
+          <p:cNvPicPr>
+            <a:picLocks noChangeAspect="1"/>
+          </p:cNvPicPr>
+          <p:nvPr/>
+        </p:nvPicPr>
+        <p:blipFill>
+          <a:blip r:embed="rId3">
+            <a:extLst>
+              <a:ext uri="{28A0092B-C50C-407E-A947-70E740481C1C}">
+                <a14:useLocalDpi xmlns:a14="http://schemas.microsoft.com/office/drawing/2010/main" val="0"/>
+              </a:ext>
+            </a:extLst>
+          </a:blip>
+          <a:stretch>
+            <a:fillRect/>
+          </a:stretch>
+        </p:blipFill>
+        <p:spPr>
+          <a:xfrm>
+            <a:off x="7619171" y="457200"/>
+            <a:ext cx="2800351" cy="2100263"/>
+          </a:xfrm>
+          <a:prstGeom prst="rect">
+            <a:avLst/>
+          </a:prstGeom>
+        </p:spPr>
+      </p:pic>
+      <p:sp>
+        <p:nvSpPr>
+          <p:cNvPr id="7" name="Textfeld 6">
+            <a:extLst>
+              <a:ext uri="{FF2B5EF4-FFF2-40B4-BE49-F238E27FC236}">
+                <a16:creationId xmlns:a16="http://schemas.microsoft.com/office/drawing/2014/main" id="{3CEB0ABD-1AE6-D3D1-B685-D45185C0B6E3}"/>
+              </a:ext>
+            </a:extLst>
+          </p:cNvPr>
+          <p:cNvSpPr txBox="1"/>
+          <p:nvPr/>
+        </p:nvSpPr>
+        <p:spPr>
+          <a:xfrm>
+            <a:off x="7722705" y="2242451"/>
+            <a:ext cx="1561672" cy="215444"/>
+          </a:xfrm>
+          <a:prstGeom prst="rect">
+            <a:avLst/>
+          </a:prstGeom>
+          <a:noFill/>
+        </p:spPr>
+        <p:txBody>
+          <a:bodyPr wrap="square" rtlCol="0">
+            <a:spAutoFit/>
+          </a:bodyPr>
+          <a:lstStyle/>
+          <a:p>
+            <a:r>
+              <a:rPr lang="de-DE" sz="800" dirty="0"/>
+              <a:t>Abbildung 1</a:t>
+            </a:r>
           </a:p>
         </p:txBody>
       </p:sp>
@@ -6696,10 +8594,91 @@
           <a:p>
             <a:pPr rtl="0"/>
             <a:r>
-              <a:rPr lang="de-DE"/>
-              <a:t>Abbildung 1: https://www.komputer.de/zen/index.php?main_page=product_info&amp;products_id=150</a:t>
-            </a:r>
-            <a:endParaRPr lang="en-US"/>
+              <a:rPr lang="de-DE" dirty="0"/>
+              <a:t>Abbildung</a:t>
+            </a:r>
+            <a:r>
+              <a:rPr lang="en-US" dirty="0"/>
+              <a:t> 2: </a:t>
+            </a:r>
+            <a:r>
+              <a:rPr lang="en-US" dirty="0">
+                <a:hlinkClick r:id="rId2"/>
+              </a:rPr>
+              <a:t>https://lastminuteengineers.com/oled-display-esp8266-tutorial/</a:t>
+            </a:r>
+            <a:endParaRPr lang="en-US" dirty="0"/>
+          </a:p>
+        </p:txBody>
+      </p:sp>
+      <p:pic>
+        <p:nvPicPr>
+          <p:cNvPr id="8" name="Grafik 7">
+            <a:extLst>
+              <a:ext uri="{FF2B5EF4-FFF2-40B4-BE49-F238E27FC236}">
+                <a16:creationId xmlns:a16="http://schemas.microsoft.com/office/drawing/2014/main" id="{5F04CB7D-A883-7536-13D3-88F25430FD21}"/>
+              </a:ext>
+            </a:extLst>
+          </p:cNvPr>
+          <p:cNvPicPr>
+            <a:picLocks noChangeAspect="1"/>
+          </p:cNvPicPr>
+          <p:nvPr/>
+        </p:nvPicPr>
+        <p:blipFill>
+          <a:blip r:embed="rId3">
+            <a:extLst>
+              <a:ext uri="{28A0092B-C50C-407E-A947-70E740481C1C}">
+                <a14:useLocalDpi xmlns:a14="http://schemas.microsoft.com/office/drawing/2010/main" val="0"/>
+              </a:ext>
+            </a:extLst>
+          </a:blip>
+          <a:stretch>
+            <a:fillRect/>
+          </a:stretch>
+        </p:blipFill>
+        <p:spPr>
+          <a:xfrm>
+            <a:off x="9233830" y="2715545"/>
+            <a:ext cx="1990725" cy="1990725"/>
+          </a:xfrm>
+          <a:prstGeom prst="rect">
+            <a:avLst/>
+          </a:prstGeom>
+        </p:spPr>
+      </p:pic>
+      <p:sp>
+        <p:nvSpPr>
+          <p:cNvPr id="9" name="Textfeld 8">
+            <a:extLst>
+              <a:ext uri="{FF2B5EF4-FFF2-40B4-BE49-F238E27FC236}">
+                <a16:creationId xmlns:a16="http://schemas.microsoft.com/office/drawing/2014/main" id="{5EB86A5B-091C-57A4-1915-2D75BE6DC27A}"/>
+              </a:ext>
+            </a:extLst>
+          </p:cNvPr>
+          <p:cNvSpPr txBox="1"/>
+          <p:nvPr/>
+        </p:nvSpPr>
+        <p:spPr>
+          <a:xfrm>
+            <a:off x="9116101" y="4779688"/>
+            <a:ext cx="1043609" cy="215444"/>
+          </a:xfrm>
+          <a:prstGeom prst="rect">
+            <a:avLst/>
+          </a:prstGeom>
+          <a:noFill/>
+        </p:spPr>
+        <p:txBody>
+          <a:bodyPr wrap="square" rtlCol="0">
+            <a:spAutoFit/>
+          </a:bodyPr>
+          <a:lstStyle/>
+          <a:p>
+            <a:r>
+              <a:rPr lang="de-DE" sz="800" dirty="0"/>
+              <a:t>Abbildung 2</a:t>
+            </a:r>
           </a:p>
         </p:txBody>
       </p:sp>
@@ -6782,7 +8761,196 @@
           <a:bodyPr/>
           <a:lstStyle/>
           <a:p>
-            <a:endParaRPr lang="de-DE"/>
+            <a:r>
+              <a:rPr lang="de-DE" dirty="0"/>
+              <a:t>Strukturierung der Dateien</a:t>
+            </a:r>
+          </a:p>
+          <a:p>
+            <a:pPr>
+              <a:buFont typeface="Wingdings" panose="05000000000000000000" pitchFamily="2" charset="2"/>
+              <a:buChar char="à"/>
+            </a:pPr>
+            <a:r>
+              <a:rPr lang="de-DE" dirty="0">
+                <a:sym typeface="Wingdings" panose="05000000000000000000" pitchFamily="2" charset="2"/>
+              </a:rPr>
+              <a:t>Strukturierung nach Themenbehandlung, Gliederung in eigenen Ordnern</a:t>
+            </a:r>
+          </a:p>
+          <a:p>
+            <a:r>
+              <a:rPr lang="de-DE" dirty="0"/>
+              <a:t>„</a:t>
+            </a:r>
+            <a:r>
+              <a:rPr lang="de-DE" dirty="0" err="1"/>
+              <a:t>ampel</a:t>
+            </a:r>
+            <a:r>
+              <a:rPr lang="de-DE" dirty="0"/>
+              <a:t>“ </a:t>
+            </a:r>
+            <a:r>
+              <a:rPr lang="de-DE" dirty="0">
+                <a:sym typeface="Wingdings" panose="05000000000000000000" pitchFamily="2" charset="2"/>
+              </a:rPr>
+              <a:t> Initialisierung aller Funktionen für die Ampelsteuerung</a:t>
+            </a:r>
+            <a:endParaRPr lang="de-DE" dirty="0"/>
+          </a:p>
+          <a:p>
+            <a:r>
+              <a:rPr lang="de-DE" dirty="0"/>
+              <a:t>„</a:t>
+            </a:r>
+            <a:r>
+              <a:rPr lang="de-DE" dirty="0" err="1"/>
+              <a:t>config</a:t>
+            </a:r>
+            <a:r>
+              <a:rPr lang="de-DE" dirty="0"/>
+              <a:t>“ </a:t>
+            </a:r>
+            <a:r>
+              <a:rPr lang="de-DE" dirty="0">
+                <a:sym typeface="Wingdings" panose="05000000000000000000" pitchFamily="2" charset="2"/>
+              </a:rPr>
+              <a:t> Konfigurationseinstellungen  (Pragma, globale „Definitionen“, PLL)</a:t>
+            </a:r>
+            <a:endParaRPr lang="de-DE" dirty="0"/>
+          </a:p>
+          <a:p>
+            <a:r>
+              <a:rPr lang="de-DE" dirty="0"/>
+              <a:t>„</a:t>
+            </a:r>
+            <a:r>
+              <a:rPr lang="de-DE" dirty="0" err="1"/>
+              <a:t>dht</a:t>
+            </a:r>
+            <a:r>
+              <a:rPr lang="de-DE" dirty="0"/>
+              <a:t>“ </a:t>
+            </a:r>
+            <a:r>
+              <a:rPr lang="de-DE" dirty="0">
+                <a:sym typeface="Wingdings" panose="05000000000000000000" pitchFamily="2" charset="2"/>
+              </a:rPr>
+              <a:t> Initialisierung aller Funktionen für den DHT22</a:t>
+            </a:r>
+            <a:endParaRPr lang="de-DE" dirty="0"/>
+          </a:p>
+          <a:p>
+            <a:r>
+              <a:rPr lang="de-DE" dirty="0"/>
+              <a:t>„</a:t>
+            </a:r>
+            <a:r>
+              <a:rPr lang="de-DE" dirty="0" err="1"/>
+              <a:t>oled</a:t>
+            </a:r>
+            <a:r>
+              <a:rPr lang="de-DE" dirty="0"/>
+              <a:t>“ </a:t>
+            </a:r>
+            <a:r>
+              <a:rPr lang="de-DE" dirty="0">
+                <a:sym typeface="Wingdings" panose="05000000000000000000" pitchFamily="2" charset="2"/>
+              </a:rPr>
+              <a:t> Initialisierung aller Funktionen für das OLED</a:t>
+            </a:r>
+            <a:endParaRPr lang="de-DE" dirty="0"/>
+          </a:p>
+          <a:p>
+            <a:r>
+              <a:rPr lang="de-DE" dirty="0"/>
+              <a:t>„</a:t>
+            </a:r>
+            <a:r>
+              <a:rPr lang="de-DE" dirty="0" err="1"/>
+              <a:t>timer</a:t>
+            </a:r>
+            <a:r>
+              <a:rPr lang="de-DE" dirty="0"/>
+              <a:t>“ </a:t>
+            </a:r>
+            <a:r>
+              <a:rPr lang="de-DE" dirty="0">
+                <a:sym typeface="Wingdings" panose="05000000000000000000" pitchFamily="2" charset="2"/>
+              </a:rPr>
+              <a:t> Initialisierung aller Funktionen für die </a:t>
+            </a:r>
+            <a:r>
+              <a:rPr lang="de-DE" dirty="0" err="1">
+                <a:sym typeface="Wingdings" panose="05000000000000000000" pitchFamily="2" charset="2"/>
+              </a:rPr>
+              <a:t>Timer</a:t>
+            </a:r>
+            <a:r>
+              <a:rPr lang="de-DE" dirty="0">
+                <a:sym typeface="Wingdings" panose="05000000000000000000" pitchFamily="2" charset="2"/>
+              </a:rPr>
+              <a:t> (Start-</a:t>
+            </a:r>
+            <a:r>
+              <a:rPr lang="de-DE" dirty="0" err="1">
+                <a:sym typeface="Wingdings" panose="05000000000000000000" pitchFamily="2" charset="2"/>
+              </a:rPr>
+              <a:t>Timer</a:t>
+            </a:r>
+            <a:r>
+              <a:rPr lang="de-DE" dirty="0">
+                <a:sym typeface="Wingdings" panose="05000000000000000000" pitchFamily="2" charset="2"/>
+              </a:rPr>
+              <a:t> und weiter Verlauf)</a:t>
+            </a:r>
+            <a:endParaRPr lang="de-DE" dirty="0"/>
+          </a:p>
+          <a:p>
+            <a:r>
+              <a:rPr lang="de-DE" dirty="0"/>
+              <a:t>„</a:t>
+            </a:r>
+            <a:r>
+              <a:rPr lang="de-DE" dirty="0" err="1"/>
+              <a:t>uart</a:t>
+            </a:r>
+            <a:r>
+              <a:rPr lang="de-DE" dirty="0"/>
+              <a:t>“ </a:t>
+            </a:r>
+            <a:r>
+              <a:rPr lang="de-DE" dirty="0">
+                <a:sym typeface="Wingdings" panose="05000000000000000000" pitchFamily="2" charset="2"/>
+              </a:rPr>
+              <a:t> Initialisierung aller Funktionen für die Eingabe (UART)</a:t>
+            </a:r>
+            <a:endParaRPr lang="de-DE" dirty="0"/>
+          </a:p>
+          <a:p>
+            <a:r>
+              <a:rPr lang="de-DE" dirty="0"/>
+              <a:t>„</a:t>
+            </a:r>
+            <a:r>
+              <a:rPr lang="de-DE" dirty="0" err="1"/>
+              <a:t>main</a:t>
+            </a:r>
+            <a:r>
+              <a:rPr lang="de-DE" dirty="0"/>
+              <a:t>“ </a:t>
+            </a:r>
+            <a:r>
+              <a:rPr lang="de-DE" dirty="0">
+                <a:sym typeface="Wingdings" panose="05000000000000000000" pitchFamily="2" charset="2"/>
+              </a:rPr>
+              <a:t> Steht selbstständig</a:t>
+            </a:r>
+            <a:endParaRPr lang="de-DE" dirty="0"/>
+          </a:p>
+          <a:p>
+            <a:endParaRPr lang="de-DE" dirty="0"/>
           </a:p>
         </p:txBody>
       </p:sp>
@@ -6881,7 +9049,7 @@
           <p:cNvPr id="2" name="Titel 1">
             <a:extLst>
               <a:ext uri="{FF2B5EF4-FFF2-40B4-BE49-F238E27FC236}">
-                <a16:creationId xmlns:a16="http://schemas.microsoft.com/office/drawing/2014/main" id="{3AF69C2D-A057-5049-3306-96690A618E65}"/>
+                <a16:creationId xmlns:a16="http://schemas.microsoft.com/office/drawing/2014/main" id="{556A6F46-1F8C-107A-A9FD-2B2AC4D01D55}"/>
               </a:ext>
             </a:extLst>
           </p:cNvPr>
@@ -6892,49 +9060,70 @@
             <p:ph type="title"/>
           </p:nvPr>
         </p:nvSpPr>
-        <p:spPr/>
-        <p:txBody>
-          <a:bodyPr/>
+        <p:spPr>
+          <a:xfrm>
+            <a:off x="1066800" y="642594"/>
+            <a:ext cx="10058400" cy="1371600"/>
+          </a:xfrm>
+        </p:spPr>
+        <p:txBody>
+          <a:bodyPr anchor="ctr">
+            <a:normAutofit/>
+          </a:bodyPr>
           <a:lstStyle/>
           <a:p>
             <a:r>
               <a:rPr lang="de-DE" dirty="0"/>
-              <a:t>Erkenntnis</a:t>
-            </a:r>
-          </a:p>
-        </p:txBody>
-      </p:sp>
-      <p:sp>
-        <p:nvSpPr>
-          <p:cNvPr id="3" name="Inhaltsplatzhalter 2">
+              <a:t>„</a:t>
+            </a:r>
+            <a:r>
+              <a:rPr lang="de-DE" dirty="0" err="1"/>
+              <a:t>ampel</a:t>
+            </a:r>
+            <a:r>
+              <a:rPr lang="de-DE" dirty="0"/>
+              <a:t>“</a:t>
+            </a:r>
+          </a:p>
+        </p:txBody>
+      </p:sp>
+      <p:pic>
+        <p:nvPicPr>
+          <p:cNvPr id="9" name="Inhaltsplatzhalter 8">
             <a:extLst>
               <a:ext uri="{FF2B5EF4-FFF2-40B4-BE49-F238E27FC236}">
-                <a16:creationId xmlns:a16="http://schemas.microsoft.com/office/drawing/2014/main" id="{CB54A7FC-7954-9B53-52AD-4F6240DB7E7B}"/>
+                <a16:creationId xmlns:a16="http://schemas.microsoft.com/office/drawing/2014/main" id="{92994965-F1F7-5D22-5ECD-F5E9C2653D86}"/>
               </a:ext>
             </a:extLst>
           </p:cNvPr>
-          <p:cNvSpPr>
-            <a:spLocks noGrp="1"/>
-          </p:cNvSpPr>
+          <p:cNvPicPr>
+            <a:picLocks noGrp="1" noChangeAspect="1"/>
+          </p:cNvPicPr>
           <p:nvPr>
             <p:ph idx="1"/>
           </p:nvPr>
-        </p:nvSpPr>
-        <p:spPr/>
-        <p:txBody>
-          <a:bodyPr/>
-          <a:lstStyle/>
-          <a:p>
-            <a:endParaRPr lang="de-DE"/>
-          </a:p>
-        </p:txBody>
-      </p:sp>
+        </p:nvPicPr>
+        <p:blipFill rotWithShape="1">
+          <a:blip r:embed="rId2"/>
+          <a:srcRect l="2603" t="7419" r="3462" b="8281"/>
+          <a:stretch/>
+        </p:blipFill>
+        <p:spPr>
+          <a:xfrm>
+            <a:off x="381738" y="1802166"/>
+            <a:ext cx="11459232" cy="3710867"/>
+          </a:xfrm>
+          <a:ln>
+            <a:noFill/>
+          </a:ln>
+        </p:spPr>
+      </p:pic>
       <p:sp>
         <p:nvSpPr>
           <p:cNvPr id="4" name="Datumsplatzhalter 3">
             <a:extLst>
               <a:ext uri="{FF2B5EF4-FFF2-40B4-BE49-F238E27FC236}">
-                <a16:creationId xmlns:a16="http://schemas.microsoft.com/office/drawing/2014/main" id="{EA5202A6-BEB8-D016-EB5D-26973D93BBBD}"/>
+                <a16:creationId xmlns:a16="http://schemas.microsoft.com/office/drawing/2014/main" id="{D7C8E500-7CB3-57D5-3B1D-06B2EB5A2CC5}"/>
               </a:ext>
             </a:extLst>
           </p:cNvPr>
@@ -6945,14 +9134,30 @@
             <p:ph type="dt" sz="half" idx="10"/>
           </p:nvPr>
         </p:nvSpPr>
-        <p:spPr/>
-        <p:txBody>
-          <a:bodyPr/>
+        <p:spPr>
+          <a:xfrm>
+            <a:off x="7256794" y="6035040"/>
+            <a:ext cx="2893045" cy="365760"/>
+          </a:xfrm>
+        </p:spPr>
+        <p:txBody>
+          <a:bodyPr anchor="b">
+            <a:normAutofit/>
+          </a:bodyPr>
           <a:lstStyle/>
           <a:p>
-            <a:pPr rtl="0"/>
+            <a:pPr rtl="0">
+              <a:spcAft>
+                <a:spcPts val="600"/>
+              </a:spcAft>
+            </a:pPr>
             <a:fld id="{878708FE-2DD0-4A9D-BF1C-99DA12B2423D}" type="datetime1">
               <a:rPr lang="de-DE" smtClean="0"/>
+              <a:pPr rtl="0">
+                <a:spcAft>
+                  <a:spcPts val="600"/>
+                </a:spcAft>
+              </a:pPr>
               <a:t>21.01.2023</a:t>
             </a:fld>
             <a:endParaRPr lang="en-US"/>
@@ -6964,7 +9169,7 @@
           <p:cNvPr id="5" name="Fußzeilenplatzhalter 4">
             <a:extLst>
               <a:ext uri="{FF2B5EF4-FFF2-40B4-BE49-F238E27FC236}">
-                <a16:creationId xmlns:a16="http://schemas.microsoft.com/office/drawing/2014/main" id="{6C9B2FEB-6C69-A043-FB1E-D7244235DE21}"/>
+                <a16:creationId xmlns:a16="http://schemas.microsoft.com/office/drawing/2014/main" id="{4CDCF8B7-72C1-DB48-88FE-019DFD5B9D4D}"/>
               </a:ext>
             </a:extLst>
           </p:cNvPr>
@@ -6975,24 +9180,61 @@
             <p:ph type="ftr" sz="quarter" idx="11"/>
           </p:nvPr>
         </p:nvSpPr>
-        <p:spPr/>
-        <p:txBody>
-          <a:bodyPr/>
+        <p:spPr>
+          <a:xfrm>
+            <a:off x="1066800" y="6032526"/>
+            <a:ext cx="5816600" cy="365760"/>
+          </a:xfrm>
+        </p:spPr>
+        <p:txBody>
+          <a:bodyPr anchor="b">
+            <a:normAutofit/>
+          </a:bodyPr>
           <a:lstStyle/>
           <a:p>
-            <a:pPr rtl="0"/>
-            <a:r>
-              <a:rPr lang="de-DE"/>
-              <a:t>Abbildung 1: https://www.komputer.de/zen/index.php?main_page=product_info&amp;products_id=150</a:t>
-            </a:r>
-            <a:endParaRPr lang="en-US"/>
+            <a:pPr rtl="0">
+              <a:spcAft>
+                <a:spcPts val="600"/>
+              </a:spcAft>
+            </a:pPr>
+            <a:r>
+              <a:rPr lang="de-DE" dirty="0"/>
+              <a:t>Abbildung 4: Ausschnitt „</a:t>
+            </a:r>
+            <a:r>
+              <a:rPr lang="de-DE" dirty="0" err="1"/>
+              <a:t>ampel.c</a:t>
+            </a:r>
+            <a:r>
+              <a:rPr lang="de-DE" dirty="0"/>
+              <a:t>“ </a:t>
+            </a:r>
+            <a:r>
+              <a:rPr lang="de-DE" dirty="0">
+                <a:sym typeface="Wingdings" panose="05000000000000000000" pitchFamily="2" charset="2"/>
+              </a:rPr>
+              <a:t> Screen </a:t>
+            </a:r>
+            <a:r>
+              <a:rPr lang="de-DE" dirty="0" err="1">
+                <a:sym typeface="Wingdings" panose="05000000000000000000" pitchFamily="2" charset="2"/>
+              </a:rPr>
+              <a:t>shot</a:t>
+            </a:r>
+            <a:r>
+              <a:rPr lang="de-DE" dirty="0">
+                <a:sym typeface="Wingdings" panose="05000000000000000000" pitchFamily="2" charset="2"/>
+              </a:rPr>
+              <a:t> 1</a:t>
+            </a:r>
+            <a:endParaRPr lang="en-US" dirty="0"/>
           </a:p>
         </p:txBody>
       </p:sp>
     </p:spTree>
     <p:extLst>
       <p:ext uri="{BB962C8B-B14F-4D97-AF65-F5344CB8AC3E}">
-        <p14:creationId xmlns:p14="http://schemas.microsoft.com/office/powerpoint/2010/main" val="796811978"/>
+        <p14:creationId xmlns:p14="http://schemas.microsoft.com/office/powerpoint/2010/main" val="1452920895"/>
       </p:ext>
     </p:extLst>
   </p:cSld>
@@ -7024,7 +9266,7 @@
           <p:cNvPr id="2" name="Titel 1">
             <a:extLst>
               <a:ext uri="{FF2B5EF4-FFF2-40B4-BE49-F238E27FC236}">
-                <a16:creationId xmlns:a16="http://schemas.microsoft.com/office/drawing/2014/main" id="{3B1A9BDC-D87D-C3C4-EE35-0284E924355F}"/>
+                <a16:creationId xmlns:a16="http://schemas.microsoft.com/office/drawing/2014/main" id="{E90FD971-9686-0720-B51E-CFC985E3FD22}"/>
               </a:ext>
             </a:extLst>
           </p:cNvPr>
@@ -7042,42 +9284,81 @@
           <a:p>
             <a:r>
               <a:rPr lang="de-DE" dirty="0"/>
-              <a:t>Quellen</a:t>
-            </a:r>
-          </a:p>
-        </p:txBody>
-      </p:sp>
-      <p:sp>
-        <p:nvSpPr>
-          <p:cNvPr id="3" name="Inhaltsplatzhalter 2">
+              <a:t>„</a:t>
+            </a:r>
+            <a:r>
+              <a:rPr lang="de-DE" dirty="0" err="1"/>
+              <a:t>config</a:t>
+            </a:r>
+            <a:r>
+              <a:rPr lang="de-DE" dirty="0"/>
+              <a:t>“</a:t>
+            </a:r>
+          </a:p>
+        </p:txBody>
+      </p:sp>
+      <p:pic>
+        <p:nvPicPr>
+          <p:cNvPr id="11" name="Inhaltsplatzhalter 10">
             <a:extLst>
               <a:ext uri="{FF2B5EF4-FFF2-40B4-BE49-F238E27FC236}">
-                <a16:creationId xmlns:a16="http://schemas.microsoft.com/office/drawing/2014/main" id="{181079F4-4937-A86C-B767-776E0F401B08}"/>
+                <a16:creationId xmlns:a16="http://schemas.microsoft.com/office/drawing/2014/main" id="{8849C843-6FE9-33FA-0093-E71E8B8E75CA}"/>
               </a:ext>
             </a:extLst>
           </p:cNvPr>
-          <p:cNvSpPr>
-            <a:spLocks noGrp="1"/>
-          </p:cNvSpPr>
-          <p:nvPr>
-            <p:ph idx="1"/>
-          </p:nvPr>
-        </p:nvSpPr>
-        <p:spPr/>
-        <p:txBody>
-          <a:bodyPr/>
-          <a:lstStyle/>
-          <a:p>
-            <a:endParaRPr lang="de-DE" dirty="0"/>
-          </a:p>
-        </p:txBody>
-      </p:sp>
+          <p:cNvPicPr>
+            <a:picLocks noGrp="1" noChangeAspect="1"/>
+          </p:cNvPicPr>
+          <p:nvPr>
+            <p:ph sz="half" idx="1"/>
+          </p:nvPr>
+        </p:nvPicPr>
+        <p:blipFill rotWithShape="1">
+          <a:blip r:embed="rId2"/>
+          <a:srcRect l="12150" t="19602" r="14758" b="17720"/>
+          <a:stretch/>
+        </p:blipFill>
+        <p:spPr>
+          <a:xfrm>
+            <a:off x="4539674" y="962635"/>
+            <a:ext cx="2540000" cy="1746250"/>
+          </a:xfrm>
+        </p:spPr>
+      </p:pic>
+      <p:pic>
+        <p:nvPicPr>
+          <p:cNvPr id="13" name="Inhaltsplatzhalter 12">
+            <a:extLst>
+              <a:ext uri="{FF2B5EF4-FFF2-40B4-BE49-F238E27FC236}">
+                <a16:creationId xmlns:a16="http://schemas.microsoft.com/office/drawing/2014/main" id="{8A1BB25B-2C2D-8B4E-E81F-C62C13466D03}"/>
+              </a:ext>
+            </a:extLst>
+          </p:cNvPr>
+          <p:cNvPicPr>
+            <a:picLocks noGrp="1" noChangeAspect="1"/>
+          </p:cNvPicPr>
+          <p:nvPr>
+            <p:ph sz="half" idx="2"/>
+          </p:nvPr>
+        </p:nvPicPr>
+        <p:blipFill rotWithShape="1">
+          <a:blip r:embed="rId3"/>
+          <a:srcRect l="4717" t="12454" r="4860" b="13856"/>
+          <a:stretch/>
+        </p:blipFill>
+        <p:spPr>
+          <a:xfrm>
+            <a:off x="735675" y="2845003"/>
+            <a:ext cx="9649231" cy="3053919"/>
+          </a:xfrm>
+        </p:spPr>
+      </p:pic>
       <p:sp>
         <p:nvSpPr>
           <p:cNvPr id="4" name="Datumsplatzhalter 3">
             <a:extLst>
               <a:ext uri="{FF2B5EF4-FFF2-40B4-BE49-F238E27FC236}">
-                <a16:creationId xmlns:a16="http://schemas.microsoft.com/office/drawing/2014/main" id="{893D3560-17B0-DDE1-185F-97588F2CA633}"/>
+                <a16:creationId xmlns:a16="http://schemas.microsoft.com/office/drawing/2014/main" id="{71000462-F506-FFD3-0428-57EB52637F04}"/>
               </a:ext>
             </a:extLst>
           </p:cNvPr>
@@ -7094,7 +9375,7 @@
           <a:lstStyle/>
           <a:p>
             <a:pPr rtl="0"/>
-            <a:fld id="{4C657CFF-1C6E-431E-9FB2-FBE8C4A16694}" type="datetime1">
+            <a:fld id="{878708FE-2DD0-4A9D-BF1C-99DA12B2423D}" type="datetime1">
               <a:rPr lang="de-DE" smtClean="0"/>
               <a:t>21.01.2023</a:t>
             </a:fld>
@@ -7107,7 +9388,7 @@
           <p:cNvPr id="5" name="Fußzeilenplatzhalter 4">
             <a:extLst>
               <a:ext uri="{FF2B5EF4-FFF2-40B4-BE49-F238E27FC236}">
-                <a16:creationId xmlns:a16="http://schemas.microsoft.com/office/drawing/2014/main" id="{66C1DDA6-C195-BD30-362F-0EFB63D3B415}"/>
+                <a16:creationId xmlns:a16="http://schemas.microsoft.com/office/drawing/2014/main" id="{B3201E68-5813-19F2-3CAA-461093AAC79C}"/>
               </a:ext>
             </a:extLst>
           </p:cNvPr>
@@ -7123,19 +9404,175 @@
           <a:bodyPr/>
           <a:lstStyle/>
           <a:p>
-            <a:pPr rtl="0"/>
-            <a:r>
-              <a:rPr lang="de-DE"/>
-              <a:t>Abbildung 1: https://www.komputer.de/zen/index.php?main_page=product_info&amp;products_id=150</a:t>
-            </a:r>
-            <a:endParaRPr lang="en-US"/>
+            <a:r>
+              <a:rPr lang="de-DE" dirty="0">
+                <a:latin typeface="Century Gothic (Textkörper)"/>
+              </a:rPr>
+              <a:t>Abbildung x: Aus </a:t>
+            </a:r>
+            <a:r>
+              <a:rPr lang="de-DE" dirty="0">
+                <a:solidFill>
+                  <a:schemeClr val="tx1"/>
+                </a:solidFill>
+                <a:latin typeface="Century Gothic (Textkörper)"/>
+              </a:rPr>
+              <a:t>„</a:t>
+            </a:r>
+            <a:r>
+              <a:rPr lang="de-DE" b="0" dirty="0" err="1">
+                <a:solidFill>
+                  <a:schemeClr val="tx1"/>
+                </a:solidFill>
+                <a:effectLst/>
+                <a:latin typeface="Century Gothic (Textkörper)"/>
+              </a:rPr>
+              <a:t>global_definitions.h</a:t>
+            </a:r>
+            <a:r>
+              <a:rPr lang="de-DE" dirty="0">
+                <a:solidFill>
+                  <a:schemeClr val="tx1"/>
+                </a:solidFill>
+                <a:latin typeface="Century Gothic (Textkörper)"/>
+              </a:rPr>
+              <a:t>“ </a:t>
+            </a:r>
+            <a:r>
+              <a:rPr lang="de-DE" dirty="0">
+                <a:solidFill>
+                  <a:schemeClr val="tx1"/>
+                </a:solidFill>
+                <a:latin typeface="Century Gothic (Textkörper)"/>
+                <a:sym typeface="Wingdings" panose="05000000000000000000" pitchFamily="2" charset="2"/>
+              </a:rPr>
+              <a:t> Screen </a:t>
+            </a:r>
+            <a:r>
+              <a:rPr lang="de-DE" dirty="0" err="1">
+                <a:solidFill>
+                  <a:schemeClr val="tx1"/>
+                </a:solidFill>
+                <a:latin typeface="Century Gothic (Textkörper)"/>
+                <a:sym typeface="Wingdings" panose="05000000000000000000" pitchFamily="2" charset="2"/>
+              </a:rPr>
+              <a:t>shot</a:t>
+            </a:r>
+            <a:r>
+              <a:rPr lang="de-DE" dirty="0">
+                <a:solidFill>
+                  <a:schemeClr val="tx1"/>
+                </a:solidFill>
+                <a:latin typeface="Century Gothic (Textkörper)"/>
+                <a:sym typeface="Wingdings" panose="05000000000000000000" pitchFamily="2" charset="2"/>
+              </a:rPr>
+              <a:t> 2</a:t>
+            </a:r>
+            <a:endParaRPr lang="de-DE" dirty="0">
+              <a:solidFill>
+                <a:schemeClr val="tx1"/>
+              </a:solidFill>
+              <a:latin typeface="Century Gothic (Textkörper)"/>
+            </a:endParaRPr>
+          </a:p>
+          <a:p>
+            <a:r>
+              <a:rPr lang="de-DE" dirty="0">
+                <a:latin typeface="Century Gothic (Textkörper)"/>
+              </a:rPr>
+              <a:t>Abbildung x: Aus </a:t>
+            </a:r>
+            <a:r>
+              <a:rPr lang="de-DE" dirty="0">
+                <a:solidFill>
+                  <a:schemeClr val="tx1"/>
+                </a:solidFill>
+                <a:latin typeface="Century Gothic (Textkörper)"/>
+              </a:rPr>
+              <a:t>„</a:t>
+            </a:r>
+            <a:r>
+              <a:rPr lang="de-DE" b="0" dirty="0" err="1">
+                <a:solidFill>
+                  <a:schemeClr val="tx1"/>
+                </a:solidFill>
+                <a:effectLst/>
+                <a:latin typeface="Century Gothic (Textkörper)"/>
+              </a:rPr>
+              <a:t>global_definitions.h</a:t>
+            </a:r>
+            <a:r>
+              <a:rPr lang="de-DE" dirty="0">
+                <a:solidFill>
+                  <a:schemeClr val="tx1"/>
+                </a:solidFill>
+                <a:latin typeface="Century Gothic (Textkörper)"/>
+              </a:rPr>
+              <a:t>“ </a:t>
+            </a:r>
+            <a:r>
+              <a:rPr lang="de-DE" dirty="0">
+                <a:solidFill>
+                  <a:schemeClr val="tx1"/>
+                </a:solidFill>
+                <a:latin typeface="Century Gothic (Textkörper)"/>
+                <a:sym typeface="Wingdings" panose="05000000000000000000" pitchFamily="2" charset="2"/>
+              </a:rPr>
+              <a:t> </a:t>
+            </a:r>
+            <a:r>
+              <a:rPr lang="de-DE" dirty="0" err="1">
+                <a:solidFill>
+                  <a:schemeClr val="tx1"/>
+                </a:solidFill>
+                <a:latin typeface="Century Gothic (Textkörper)"/>
+                <a:sym typeface="Wingdings" panose="05000000000000000000" pitchFamily="2" charset="2"/>
+              </a:rPr>
+              <a:t>Screnn</a:t>
+            </a:r>
+            <a:r>
+              <a:rPr lang="de-DE" dirty="0">
+                <a:solidFill>
+                  <a:schemeClr val="tx1"/>
+                </a:solidFill>
+                <a:latin typeface="Century Gothic (Textkörper)"/>
+                <a:sym typeface="Wingdings" panose="05000000000000000000" pitchFamily="2" charset="2"/>
+              </a:rPr>
+              <a:t> </a:t>
+            </a:r>
+            <a:r>
+              <a:rPr lang="de-DE" dirty="0" err="1">
+                <a:solidFill>
+                  <a:schemeClr val="tx1"/>
+                </a:solidFill>
+                <a:latin typeface="Century Gothic (Textkörper)"/>
+                <a:sym typeface="Wingdings" panose="05000000000000000000" pitchFamily="2" charset="2"/>
+              </a:rPr>
+              <a:t>shot</a:t>
+            </a:r>
+            <a:r>
+              <a:rPr lang="de-DE" dirty="0">
+                <a:solidFill>
+                  <a:schemeClr val="tx1"/>
+                </a:solidFill>
+                <a:latin typeface="Century Gothic (Textkörper)"/>
+                <a:sym typeface="Wingdings" panose="05000000000000000000" pitchFamily="2" charset="2"/>
+              </a:rPr>
+              <a:t> 2</a:t>
+            </a:r>
+            <a:endParaRPr lang="en-US" dirty="0">
+              <a:solidFill>
+                <a:schemeClr val="tx1"/>
+              </a:solidFill>
+              <a:latin typeface="Century Gothic (Textkörper)"/>
+            </a:endParaRPr>
           </a:p>
         </p:txBody>
       </p:sp>
     </p:spTree>
     <p:extLst>
       <p:ext uri="{BB962C8B-B14F-4D97-AF65-F5344CB8AC3E}">
-        <p14:creationId xmlns:p14="http://schemas.microsoft.com/office/powerpoint/2010/main" val="2515272364"/>
+        <p14:creationId xmlns:p14="http://schemas.microsoft.com/office/powerpoint/2010/main" val="3670765391"/>
       </p:ext>
     </p:extLst>
   </p:cSld>

</xml_diff>